<commit_message>
transition to Nt smart boy 6 part 1
</commit_message>
<xml_diff>
--- a/NeuronAttributeDocument.pptx
+++ b/NeuronAttributeDocument.pptx
@@ -6,6 +6,7 @@
   </p:sldMasterIdLst>
   <p:sldIdLst>
     <p:sldId id="256" r:id="rId2"/>
+    <p:sldId id="257" r:id="rId3"/>
   </p:sldIdLst>
   <p:sldSz cx="12192000" cy="6858000"/>
   <p:notesSz cx="6858000" cy="9144000"/>
@@ -243,7 +244,7 @@
           <a:p>
             <a:fld id="{C45426CC-120F-46FE-AA28-A906AD80CCC7}" type="datetimeFigureOut">
               <a:rPr lang="en-CA" smtClean="0"/>
-              <a:t>2021-12-31</a:t>
+              <a:t>2022-10-15</a:t>
             </a:fld>
             <a:endParaRPr lang="en-CA"/>
           </a:p>
@@ -413,7 +414,7 @@
           <a:p>
             <a:fld id="{C45426CC-120F-46FE-AA28-A906AD80CCC7}" type="datetimeFigureOut">
               <a:rPr lang="en-CA" smtClean="0"/>
-              <a:t>2021-12-31</a:t>
+              <a:t>2022-10-15</a:t>
             </a:fld>
             <a:endParaRPr lang="en-CA"/>
           </a:p>
@@ -593,7 +594,7 @@
           <a:p>
             <a:fld id="{C45426CC-120F-46FE-AA28-A906AD80CCC7}" type="datetimeFigureOut">
               <a:rPr lang="en-CA" smtClean="0"/>
-              <a:t>2021-12-31</a:t>
+              <a:t>2022-10-15</a:t>
             </a:fld>
             <a:endParaRPr lang="en-CA"/>
           </a:p>
@@ -763,7 +764,7 @@
           <a:p>
             <a:fld id="{C45426CC-120F-46FE-AA28-A906AD80CCC7}" type="datetimeFigureOut">
               <a:rPr lang="en-CA" smtClean="0"/>
-              <a:t>2021-12-31</a:t>
+              <a:t>2022-10-15</a:t>
             </a:fld>
             <a:endParaRPr lang="en-CA"/>
           </a:p>
@@ -1009,7 +1010,7 @@
           <a:p>
             <a:fld id="{C45426CC-120F-46FE-AA28-A906AD80CCC7}" type="datetimeFigureOut">
               <a:rPr lang="en-CA" smtClean="0"/>
-              <a:t>2021-12-31</a:t>
+              <a:t>2022-10-15</a:t>
             </a:fld>
             <a:endParaRPr lang="en-CA"/>
           </a:p>
@@ -1241,7 +1242,7 @@
           <a:p>
             <a:fld id="{C45426CC-120F-46FE-AA28-A906AD80CCC7}" type="datetimeFigureOut">
               <a:rPr lang="en-CA" smtClean="0"/>
-              <a:t>2021-12-31</a:t>
+              <a:t>2022-10-15</a:t>
             </a:fld>
             <a:endParaRPr lang="en-CA"/>
           </a:p>
@@ -1608,7 +1609,7 @@
           <a:p>
             <a:fld id="{C45426CC-120F-46FE-AA28-A906AD80CCC7}" type="datetimeFigureOut">
               <a:rPr lang="en-CA" smtClean="0"/>
-              <a:t>2021-12-31</a:t>
+              <a:t>2022-10-15</a:t>
             </a:fld>
             <a:endParaRPr lang="en-CA"/>
           </a:p>
@@ -1726,7 +1727,7 @@
           <a:p>
             <a:fld id="{C45426CC-120F-46FE-AA28-A906AD80CCC7}" type="datetimeFigureOut">
               <a:rPr lang="en-CA" smtClean="0"/>
-              <a:t>2021-12-31</a:t>
+              <a:t>2022-10-15</a:t>
             </a:fld>
             <a:endParaRPr lang="en-CA"/>
           </a:p>
@@ -1821,7 +1822,7 @@
           <a:p>
             <a:fld id="{C45426CC-120F-46FE-AA28-A906AD80CCC7}" type="datetimeFigureOut">
               <a:rPr lang="en-CA" smtClean="0"/>
-              <a:t>2021-12-31</a:t>
+              <a:t>2022-10-15</a:t>
             </a:fld>
             <a:endParaRPr lang="en-CA"/>
           </a:p>
@@ -2098,7 +2099,7 @@
           <a:p>
             <a:fld id="{C45426CC-120F-46FE-AA28-A906AD80CCC7}" type="datetimeFigureOut">
               <a:rPr lang="en-CA" smtClean="0"/>
-              <a:t>2021-12-31</a:t>
+              <a:t>2022-10-15</a:t>
             </a:fld>
             <a:endParaRPr lang="en-CA"/>
           </a:p>
@@ -2355,7 +2356,7 @@
           <a:p>
             <a:fld id="{C45426CC-120F-46FE-AA28-A906AD80CCC7}" type="datetimeFigureOut">
               <a:rPr lang="en-CA" smtClean="0"/>
-              <a:t>2021-12-31</a:t>
+              <a:t>2022-10-15</a:t>
             </a:fld>
             <a:endParaRPr lang="en-CA"/>
           </a:p>
@@ -2568,7 +2569,7 @@
           <a:p>
             <a:fld id="{C45426CC-120F-46FE-AA28-A906AD80CCC7}" type="datetimeFigureOut">
               <a:rPr lang="en-CA" smtClean="0"/>
-              <a:t>2021-12-31</a:t>
+              <a:t>2022-10-15</a:t>
             </a:fld>
             <a:endParaRPr lang="en-CA"/>
           </a:p>
@@ -4106,102 +4107,6 @@
       </p:sp>
       <p:sp>
         <p:nvSpPr>
-          <p:cNvPr id="44" name="Oval 43">
-            <a:extLst>
-              <a:ext uri="{FF2B5EF4-FFF2-40B4-BE49-F238E27FC236}">
-                <a16:creationId xmlns:a16="http://schemas.microsoft.com/office/drawing/2014/main" id="{19DC4DCC-18E6-4E0E-B79B-ED15371BF0DC}"/>
-              </a:ext>
-            </a:extLst>
-          </p:cNvPr>
-          <p:cNvSpPr/>
-          <p:nvPr/>
-        </p:nvSpPr>
-        <p:spPr>
-          <a:xfrm>
-            <a:off x="1082617" y="1157606"/>
-            <a:ext cx="368736" cy="369333"/>
-          </a:xfrm>
-          <a:prstGeom prst="ellipse">
-            <a:avLst/>
-          </a:prstGeom>
-        </p:spPr>
-        <p:style>
-          <a:lnRef idx="2">
-            <a:schemeClr val="accent1">
-              <a:shade val="50000"/>
-            </a:schemeClr>
-          </a:lnRef>
-          <a:fillRef idx="1">
-            <a:schemeClr val="accent1"/>
-          </a:fillRef>
-          <a:effectRef idx="0">
-            <a:schemeClr val="accent1"/>
-          </a:effectRef>
-          <a:fontRef idx="minor">
-            <a:schemeClr val="lt1"/>
-          </a:fontRef>
-        </p:style>
-        <p:txBody>
-          <a:bodyPr rtlCol="0" anchor="ctr"/>
-          <a:lstStyle/>
-          <a:p>
-            <a:pPr algn="ctr"/>
-            <a:endParaRPr lang="en-CA">
-              <a:latin typeface="Consolas" panose="020B0609020204030204" pitchFamily="49" charset="0"/>
-            </a:endParaRPr>
-          </a:p>
-        </p:txBody>
-      </p:sp>
-      <p:sp>
-        <p:nvSpPr>
-          <p:cNvPr id="45" name="Oval 44">
-            <a:extLst>
-              <a:ext uri="{FF2B5EF4-FFF2-40B4-BE49-F238E27FC236}">
-                <a16:creationId xmlns:a16="http://schemas.microsoft.com/office/drawing/2014/main" id="{C12E5EB5-D547-4A38-BA0A-C58351A68E85}"/>
-              </a:ext>
-            </a:extLst>
-          </p:cNvPr>
-          <p:cNvSpPr/>
-          <p:nvPr/>
-        </p:nvSpPr>
-        <p:spPr>
-          <a:xfrm>
-            <a:off x="1082617" y="3952351"/>
-            <a:ext cx="368736" cy="369333"/>
-          </a:xfrm>
-          <a:prstGeom prst="ellipse">
-            <a:avLst/>
-          </a:prstGeom>
-        </p:spPr>
-        <p:style>
-          <a:lnRef idx="2">
-            <a:schemeClr val="accent1">
-              <a:shade val="50000"/>
-            </a:schemeClr>
-          </a:lnRef>
-          <a:fillRef idx="1">
-            <a:schemeClr val="accent1"/>
-          </a:fillRef>
-          <a:effectRef idx="0">
-            <a:schemeClr val="accent1"/>
-          </a:effectRef>
-          <a:fontRef idx="minor">
-            <a:schemeClr val="lt1"/>
-          </a:fontRef>
-        </p:style>
-        <p:txBody>
-          <a:bodyPr rtlCol="0" anchor="ctr"/>
-          <a:lstStyle/>
-          <a:p>
-            <a:pPr algn="ctr"/>
-            <a:endParaRPr lang="en-CA">
-              <a:latin typeface="Consolas" panose="020B0609020204030204" pitchFamily="49" charset="0"/>
-            </a:endParaRPr>
-          </a:p>
-        </p:txBody>
-      </p:sp>
-      <p:sp>
-        <p:nvSpPr>
           <p:cNvPr id="46" name="TextBox 45">
             <a:extLst>
               <a:ext uri="{FF2B5EF4-FFF2-40B4-BE49-F238E27FC236}">
@@ -4214,7 +4119,7 @@
         </p:nvSpPr>
         <p:spPr>
           <a:xfrm>
-            <a:off x="650433" y="996630"/>
+            <a:off x="516712" y="1138933"/>
             <a:ext cx="531139" cy="261610"/>
           </a:xfrm>
           <a:prstGeom prst="rect">
@@ -4240,50 +4145,6 @@
                 <a:latin typeface="Consolas" panose="020B0609020204030204" pitchFamily="49" charset="0"/>
               </a:rPr>
               <a:t>in</a:t>
-            </a:r>
-          </a:p>
-        </p:txBody>
-      </p:sp>
-      <p:sp>
-        <p:nvSpPr>
-          <p:cNvPr id="47" name="TextBox 46">
-            <a:extLst>
-              <a:ext uri="{FF2B5EF4-FFF2-40B4-BE49-F238E27FC236}">
-                <a16:creationId xmlns:a16="http://schemas.microsoft.com/office/drawing/2014/main" id="{45D74D6C-E435-4E66-B360-9A648B4D093F}"/>
-              </a:ext>
-            </a:extLst>
-          </p:cNvPr>
-          <p:cNvSpPr txBox="1"/>
-          <p:nvPr/>
-        </p:nvSpPr>
-        <p:spPr>
-          <a:xfrm>
-            <a:off x="1401464" y="4167859"/>
-            <a:ext cx="531139" cy="261610"/>
-          </a:xfrm>
-          <a:prstGeom prst="rect">
-            <a:avLst/>
-          </a:prstGeom>
-          <a:noFill/>
-          <a:ln w="28575">
-            <a:solidFill>
-              <a:schemeClr val="tx1"/>
-            </a:solidFill>
-            <a:prstDash val="sysDash"/>
-          </a:ln>
-        </p:spPr>
-        <p:txBody>
-          <a:bodyPr wrap="square" rtlCol="0">
-            <a:spAutoFit/>
-          </a:bodyPr>
-          <a:lstStyle/>
-          <a:p>
-            <a:pPr algn="ctr"/>
-            <a:r>
-              <a:rPr lang="en-CA" sz="1100">
-                <a:latin typeface="Consolas" panose="020B0609020204030204" pitchFamily="49" charset="0"/>
-              </a:rPr>
-              <a:t>out</a:t>
             </a:r>
           </a:p>
         </p:txBody>
@@ -4819,7 +4680,7 @@
         </p:nvSpPr>
         <p:spPr>
           <a:xfrm>
-            <a:off x="2155063" y="3565595"/>
+            <a:off x="2451428" y="2690412"/>
             <a:ext cx="785511" cy="261610"/>
           </a:xfrm>
           <a:prstGeom prst="rect">
@@ -5454,6 +5315,2513 @@
     <p:extLst>
       <p:ext uri="{BB962C8B-B14F-4D97-AF65-F5344CB8AC3E}">
         <p14:creationId xmlns:p14="http://schemas.microsoft.com/office/powerpoint/2010/main" val="799722973"/>
+      </p:ext>
+    </p:extLst>
+  </p:cSld>
+  <p:clrMapOvr>
+    <a:masterClrMapping/>
+  </p:clrMapOvr>
+</p:sld>
+</file>
+
+<file path=ppt/slides/slide2.xml><?xml version="1.0" encoding="utf-8"?>
+<p:sld xmlns:a="http://schemas.openxmlformats.org/drawingml/2006/main" xmlns:r="http://schemas.openxmlformats.org/officeDocument/2006/relationships" xmlns:p="http://schemas.openxmlformats.org/presentationml/2006/main">
+  <p:cSld>
+    <p:spTree>
+      <p:nvGrpSpPr>
+        <p:cNvPr id="1" name=""/>
+        <p:cNvGrpSpPr/>
+        <p:nvPr/>
+      </p:nvGrpSpPr>
+      <p:grpSpPr>
+        <a:xfrm>
+          <a:off x="0" y="0"/>
+          <a:ext cx="0" cy="0"/>
+          <a:chOff x="0" y="0"/>
+          <a:chExt cx="0" cy="0"/>
+        </a:xfrm>
+      </p:grpSpPr>
+      <p:cxnSp>
+        <p:nvCxnSpPr>
+          <p:cNvPr id="88" name="Straight Arrow Connector 87">
+            <a:extLst>
+              <a:ext uri="{FF2B5EF4-FFF2-40B4-BE49-F238E27FC236}">
+                <a16:creationId xmlns:a16="http://schemas.microsoft.com/office/drawing/2014/main" id="{267359F8-A580-4F6A-906F-A2E4FD623878}"/>
+              </a:ext>
+            </a:extLst>
+          </p:cNvPr>
+          <p:cNvCxnSpPr>
+            <a:cxnSpLocks/>
+          </p:cNvCxnSpPr>
+          <p:nvPr/>
+        </p:nvCxnSpPr>
+        <p:spPr>
+          <a:xfrm flipH="1">
+            <a:off x="3878175" y="2468820"/>
+            <a:ext cx="1258611" cy="926877"/>
+          </a:xfrm>
+          <a:prstGeom prst="straightConnector1">
+            <a:avLst/>
+          </a:prstGeom>
+          <a:ln w="76200">
+            <a:solidFill>
+              <a:srgbClr val="FFC000"/>
+            </a:solidFill>
+            <a:headEnd type="none" w="med" len="med"/>
+            <a:tailEnd type="arrow" w="med" len="med"/>
+          </a:ln>
+        </p:spPr>
+        <p:style>
+          <a:lnRef idx="1">
+            <a:schemeClr val="accent1"/>
+          </a:lnRef>
+          <a:fillRef idx="0">
+            <a:schemeClr val="accent1"/>
+          </a:fillRef>
+          <a:effectRef idx="0">
+            <a:schemeClr val="accent1"/>
+          </a:effectRef>
+          <a:fontRef idx="minor">
+            <a:schemeClr val="tx1"/>
+          </a:fontRef>
+        </p:style>
+      </p:cxnSp>
+      <p:sp>
+        <p:nvSpPr>
+          <p:cNvPr id="4" name="Rectangle 3">
+            <a:extLst>
+              <a:ext uri="{FF2B5EF4-FFF2-40B4-BE49-F238E27FC236}">
+                <a16:creationId xmlns:a16="http://schemas.microsoft.com/office/drawing/2014/main" id="{D12A4A32-A378-458C-A179-CC1A1280E0A3}"/>
+              </a:ext>
+            </a:extLst>
+          </p:cNvPr>
+          <p:cNvSpPr/>
+          <p:nvPr/>
+        </p:nvSpPr>
+        <p:spPr>
+          <a:xfrm>
+            <a:off x="7600594" y="5078313"/>
+            <a:ext cx="2657475" cy="647700"/>
+          </a:xfrm>
+          <a:prstGeom prst="rect">
+            <a:avLst/>
+          </a:prstGeom>
+        </p:spPr>
+        <p:style>
+          <a:lnRef idx="2">
+            <a:schemeClr val="accent1">
+              <a:shade val="50000"/>
+            </a:schemeClr>
+          </a:lnRef>
+          <a:fillRef idx="1">
+            <a:schemeClr val="accent1"/>
+          </a:fillRef>
+          <a:effectRef idx="0">
+            <a:schemeClr val="accent1"/>
+          </a:effectRef>
+          <a:fontRef idx="minor">
+            <a:schemeClr val="lt1"/>
+          </a:fontRef>
+        </p:style>
+        <p:txBody>
+          <a:bodyPr rtlCol="0" anchor="ctr"/>
+          <a:lstStyle/>
+          <a:p>
+            <a:pPr algn="ctr"/>
+            <a:endParaRPr lang="en-CA">
+              <a:latin typeface="Consolas" panose="020B0609020204030204" pitchFamily="49" charset="0"/>
+            </a:endParaRPr>
+          </a:p>
+        </p:txBody>
+      </p:sp>
+      <p:sp>
+        <p:nvSpPr>
+          <p:cNvPr id="5" name="Rectangle 4">
+            <a:extLst>
+              <a:ext uri="{FF2B5EF4-FFF2-40B4-BE49-F238E27FC236}">
+                <a16:creationId xmlns:a16="http://schemas.microsoft.com/office/drawing/2014/main" id="{CC152329-3E92-42B5-90D2-BF49C07AAE94}"/>
+              </a:ext>
+            </a:extLst>
+          </p:cNvPr>
+          <p:cNvSpPr/>
+          <p:nvPr/>
+        </p:nvSpPr>
+        <p:spPr>
+          <a:xfrm>
+            <a:off x="7352008" y="3673984"/>
+            <a:ext cx="2657475" cy="647700"/>
+          </a:xfrm>
+          <a:prstGeom prst="rect">
+            <a:avLst/>
+          </a:prstGeom>
+        </p:spPr>
+        <p:style>
+          <a:lnRef idx="2">
+            <a:schemeClr val="accent1">
+              <a:shade val="50000"/>
+            </a:schemeClr>
+          </a:lnRef>
+          <a:fillRef idx="1">
+            <a:schemeClr val="accent1"/>
+          </a:fillRef>
+          <a:effectRef idx="0">
+            <a:schemeClr val="accent1"/>
+          </a:effectRef>
+          <a:fontRef idx="minor">
+            <a:schemeClr val="lt1"/>
+          </a:fontRef>
+        </p:style>
+        <p:txBody>
+          <a:bodyPr rtlCol="0" anchor="ctr"/>
+          <a:lstStyle/>
+          <a:p>
+            <a:pPr algn="ctr"/>
+            <a:endParaRPr lang="en-CA">
+              <a:latin typeface="Consolas" panose="020B0609020204030204" pitchFamily="49" charset="0"/>
+            </a:endParaRPr>
+          </a:p>
+        </p:txBody>
+      </p:sp>
+      <p:sp>
+        <p:nvSpPr>
+          <p:cNvPr id="6" name="TextBox 5">
+            <a:extLst>
+              <a:ext uri="{FF2B5EF4-FFF2-40B4-BE49-F238E27FC236}">
+                <a16:creationId xmlns:a16="http://schemas.microsoft.com/office/drawing/2014/main" id="{AD74B955-14FF-4C9D-A3E0-AEE56080F87D}"/>
+              </a:ext>
+            </a:extLst>
+          </p:cNvPr>
+          <p:cNvSpPr txBox="1"/>
+          <p:nvPr/>
+        </p:nvSpPr>
+        <p:spPr>
+          <a:xfrm>
+            <a:off x="385864" y="316416"/>
+            <a:ext cx="1323975" cy="369332"/>
+          </a:xfrm>
+          <a:prstGeom prst="rect">
+            <a:avLst/>
+          </a:prstGeom>
+          <a:noFill/>
+          <a:ln w="28575">
+            <a:solidFill>
+              <a:schemeClr val="tx1"/>
+            </a:solidFill>
+            <a:prstDash val="sysDash"/>
+          </a:ln>
+        </p:spPr>
+        <p:txBody>
+          <a:bodyPr wrap="square" rtlCol="0">
+            <a:spAutoFit/>
+          </a:bodyPr>
+          <a:lstStyle/>
+          <a:p>
+            <a:r>
+              <a:rPr lang="en-CA">
+                <a:solidFill>
+                  <a:schemeClr val="accent5">
+                    <a:lumMod val="75000"/>
+                  </a:schemeClr>
+                </a:solidFill>
+                <a:latin typeface="Consolas" panose="020B0609020204030204" pitchFamily="49" charset="0"/>
+              </a:rPr>
+              <a:t>Model</a:t>
+            </a:r>
+          </a:p>
+        </p:txBody>
+      </p:sp>
+      <p:sp>
+        <p:nvSpPr>
+          <p:cNvPr id="8" name="TextBox 7">
+            <a:extLst>
+              <a:ext uri="{FF2B5EF4-FFF2-40B4-BE49-F238E27FC236}">
+                <a16:creationId xmlns:a16="http://schemas.microsoft.com/office/drawing/2014/main" id="{134AE5AA-C425-403E-BD9A-13AE66940A80}"/>
+              </a:ext>
+            </a:extLst>
+          </p:cNvPr>
+          <p:cNvSpPr txBox="1"/>
+          <p:nvPr/>
+        </p:nvSpPr>
+        <p:spPr>
+          <a:xfrm>
+            <a:off x="7463328" y="1023085"/>
+            <a:ext cx="2657469" cy="861774"/>
+          </a:xfrm>
+          <a:prstGeom prst="rect">
+            <a:avLst/>
+          </a:prstGeom>
+          <a:noFill/>
+          <a:ln w="28575">
+            <a:solidFill>
+              <a:schemeClr val="tx1"/>
+            </a:solidFill>
+            <a:prstDash val="sysDash"/>
+          </a:ln>
+        </p:spPr>
+        <p:txBody>
+          <a:bodyPr wrap="square" rtlCol="0">
+            <a:spAutoFit/>
+          </a:bodyPr>
+          <a:lstStyle/>
+          <a:p>
+            <a:r>
+              <a:rPr lang="en-CA" sz="1000">
+                <a:solidFill>
+                  <a:schemeClr val="accent4"/>
+                </a:solidFill>
+                <a:latin typeface="Consolas" panose="020B0609020204030204" pitchFamily="49" charset="0"/>
+              </a:rPr>
+              <a:t>Neuron Attributes (per type)</a:t>
+            </a:r>
+          </a:p>
+          <a:p>
+            <a:r>
+              <a:rPr lang="en-CA" sz="1000">
+                <a:solidFill>
+                  <a:schemeClr val="tx1">
+                    <a:lumMod val="50000"/>
+                  </a:schemeClr>
+                </a:solidFill>
+                <a:latin typeface="Consolas" panose="020B0609020204030204" pitchFamily="49" charset="0"/>
+              </a:rPr>
+              <a:t>potential</a:t>
+            </a:r>
+          </a:p>
+          <a:p>
+            <a:r>
+              <a:rPr lang="en-CA" sz="1000">
+                <a:latin typeface="Consolas" panose="020B0609020204030204" pitchFamily="49" charset="0"/>
+              </a:rPr>
+              <a:t>neuronThresholdAve</a:t>
+            </a:r>
+          </a:p>
+          <a:p>
+            <a:r>
+              <a:rPr lang="en-CA" sz="1000">
+                <a:latin typeface="Consolas" panose="020B0609020204030204" pitchFamily="49" charset="0"/>
+              </a:rPr>
+              <a:t>neuronPortionVal</a:t>
+            </a:r>
+          </a:p>
+          <a:p>
+            <a:endParaRPr lang="en-CA" sz="1000">
+              <a:latin typeface="Consolas" panose="020B0609020204030204" pitchFamily="49" charset="0"/>
+            </a:endParaRPr>
+          </a:p>
+        </p:txBody>
+      </p:sp>
+      <p:cxnSp>
+        <p:nvCxnSpPr>
+          <p:cNvPr id="10" name="Straight Arrow Connector 9">
+            <a:extLst>
+              <a:ext uri="{FF2B5EF4-FFF2-40B4-BE49-F238E27FC236}">
+                <a16:creationId xmlns:a16="http://schemas.microsoft.com/office/drawing/2014/main" id="{39152865-48F7-43BA-9850-E778444428C5}"/>
+              </a:ext>
+            </a:extLst>
+          </p:cNvPr>
+          <p:cNvCxnSpPr>
+            <a:cxnSpLocks/>
+            <a:stCxn id="7" idx="6"/>
+            <a:endCxn id="8" idx="1"/>
+          </p:cNvCxnSpPr>
+          <p:nvPr/>
+        </p:nvCxnSpPr>
+        <p:spPr>
+          <a:xfrm flipV="1">
+            <a:off x="6136911" y="1453972"/>
+            <a:ext cx="1326417" cy="1048900"/>
+          </a:xfrm>
+          <a:prstGeom prst="straightConnector1">
+            <a:avLst/>
+          </a:prstGeom>
+          <a:ln>
+            <a:solidFill>
+              <a:schemeClr val="tx1"/>
+            </a:solidFill>
+            <a:tailEnd type="triangle"/>
+          </a:ln>
+        </p:spPr>
+        <p:style>
+          <a:lnRef idx="1">
+            <a:schemeClr val="accent1"/>
+          </a:lnRef>
+          <a:fillRef idx="0">
+            <a:schemeClr val="accent1"/>
+          </a:fillRef>
+          <a:effectRef idx="0">
+            <a:schemeClr val="accent1"/>
+          </a:effectRef>
+          <a:fontRef idx="minor">
+            <a:schemeClr val="tx1"/>
+          </a:fontRef>
+        </p:style>
+      </p:cxnSp>
+      <p:cxnSp>
+        <p:nvCxnSpPr>
+          <p:cNvPr id="17" name="Straight Arrow Connector 16">
+            <a:extLst>
+              <a:ext uri="{FF2B5EF4-FFF2-40B4-BE49-F238E27FC236}">
+                <a16:creationId xmlns:a16="http://schemas.microsoft.com/office/drawing/2014/main" id="{9E1FC3A0-C8B9-43BD-96F5-94DB03EBA7E5}"/>
+              </a:ext>
+            </a:extLst>
+          </p:cNvPr>
+          <p:cNvCxnSpPr>
+            <a:cxnSpLocks/>
+          </p:cNvCxnSpPr>
+          <p:nvPr/>
+        </p:nvCxnSpPr>
+        <p:spPr>
+          <a:xfrm>
+            <a:off x="4722512" y="1061580"/>
+            <a:ext cx="139085" cy="555429"/>
+          </a:xfrm>
+          <a:prstGeom prst="straightConnector1">
+            <a:avLst/>
+          </a:prstGeom>
+          <a:ln w="76200">
+            <a:solidFill>
+              <a:schemeClr val="accent5">
+                <a:lumMod val="60000"/>
+                <a:lumOff val="40000"/>
+              </a:schemeClr>
+            </a:solidFill>
+            <a:headEnd type="none" w="med" len="med"/>
+            <a:tailEnd type="arrow" w="med" len="med"/>
+          </a:ln>
+        </p:spPr>
+        <p:style>
+          <a:lnRef idx="1">
+            <a:schemeClr val="accent1"/>
+          </a:lnRef>
+          <a:fillRef idx="0">
+            <a:schemeClr val="accent1"/>
+          </a:fillRef>
+          <a:effectRef idx="0">
+            <a:schemeClr val="accent1"/>
+          </a:effectRef>
+          <a:fontRef idx="minor">
+            <a:schemeClr val="tx1"/>
+          </a:fontRef>
+        </p:style>
+      </p:cxnSp>
+      <p:sp>
+        <p:nvSpPr>
+          <p:cNvPr id="28" name="Oval 27">
+            <a:extLst>
+              <a:ext uri="{FF2B5EF4-FFF2-40B4-BE49-F238E27FC236}">
+                <a16:creationId xmlns:a16="http://schemas.microsoft.com/office/drawing/2014/main" id="{6B467A1C-8A23-4C3E-8945-77E28C4107BD}"/>
+              </a:ext>
+            </a:extLst>
+          </p:cNvPr>
+          <p:cNvSpPr/>
+          <p:nvPr/>
+        </p:nvSpPr>
+        <p:spPr>
+          <a:xfrm>
+            <a:off x="295275" y="1753846"/>
+            <a:ext cx="368736" cy="369333"/>
+          </a:xfrm>
+          <a:prstGeom prst="ellipse">
+            <a:avLst/>
+          </a:prstGeom>
+        </p:spPr>
+        <p:style>
+          <a:lnRef idx="2">
+            <a:schemeClr val="accent1">
+              <a:shade val="50000"/>
+            </a:schemeClr>
+          </a:lnRef>
+          <a:fillRef idx="1">
+            <a:schemeClr val="accent1"/>
+          </a:fillRef>
+          <a:effectRef idx="0">
+            <a:schemeClr val="accent1"/>
+          </a:effectRef>
+          <a:fontRef idx="minor">
+            <a:schemeClr val="lt1"/>
+          </a:fontRef>
+        </p:style>
+        <p:txBody>
+          <a:bodyPr rtlCol="0" anchor="ctr"/>
+          <a:lstStyle/>
+          <a:p>
+            <a:pPr algn="ctr"/>
+            <a:endParaRPr lang="en-CA">
+              <a:latin typeface="Consolas" panose="020B0609020204030204" pitchFamily="49" charset="0"/>
+            </a:endParaRPr>
+          </a:p>
+        </p:txBody>
+      </p:sp>
+      <p:sp>
+        <p:nvSpPr>
+          <p:cNvPr id="29" name="Oval 28">
+            <a:extLst>
+              <a:ext uri="{FF2B5EF4-FFF2-40B4-BE49-F238E27FC236}">
+                <a16:creationId xmlns:a16="http://schemas.microsoft.com/office/drawing/2014/main" id="{F880B5D5-F458-4836-83B3-B3FAAF0D0247}"/>
+              </a:ext>
+            </a:extLst>
+          </p:cNvPr>
+          <p:cNvSpPr/>
+          <p:nvPr/>
+        </p:nvSpPr>
+        <p:spPr>
+          <a:xfrm>
+            <a:off x="815217" y="1753846"/>
+            <a:ext cx="368736" cy="369333"/>
+          </a:xfrm>
+          <a:prstGeom prst="ellipse">
+            <a:avLst/>
+          </a:prstGeom>
+        </p:spPr>
+        <p:style>
+          <a:lnRef idx="2">
+            <a:schemeClr val="accent1">
+              <a:shade val="50000"/>
+            </a:schemeClr>
+          </a:lnRef>
+          <a:fillRef idx="1">
+            <a:schemeClr val="accent1"/>
+          </a:fillRef>
+          <a:effectRef idx="0">
+            <a:schemeClr val="accent1"/>
+          </a:effectRef>
+          <a:fontRef idx="minor">
+            <a:schemeClr val="lt1"/>
+          </a:fontRef>
+        </p:style>
+        <p:txBody>
+          <a:bodyPr rtlCol="0" anchor="ctr"/>
+          <a:lstStyle/>
+          <a:p>
+            <a:pPr algn="ctr"/>
+            <a:endParaRPr lang="en-CA">
+              <a:latin typeface="Consolas" panose="020B0609020204030204" pitchFamily="49" charset="0"/>
+            </a:endParaRPr>
+          </a:p>
+        </p:txBody>
+      </p:sp>
+      <p:sp>
+        <p:nvSpPr>
+          <p:cNvPr id="30" name="Oval 29">
+            <a:extLst>
+              <a:ext uri="{FF2B5EF4-FFF2-40B4-BE49-F238E27FC236}">
+                <a16:creationId xmlns:a16="http://schemas.microsoft.com/office/drawing/2014/main" id="{9176A41F-30A3-4052-B229-8415003DAFC5}"/>
+              </a:ext>
+            </a:extLst>
+          </p:cNvPr>
+          <p:cNvSpPr/>
+          <p:nvPr/>
+        </p:nvSpPr>
+        <p:spPr>
+          <a:xfrm>
+            <a:off x="1341103" y="1753846"/>
+            <a:ext cx="368736" cy="369333"/>
+          </a:xfrm>
+          <a:prstGeom prst="ellipse">
+            <a:avLst/>
+          </a:prstGeom>
+        </p:spPr>
+        <p:style>
+          <a:lnRef idx="2">
+            <a:schemeClr val="accent1">
+              <a:shade val="50000"/>
+            </a:schemeClr>
+          </a:lnRef>
+          <a:fillRef idx="1">
+            <a:schemeClr val="accent1"/>
+          </a:fillRef>
+          <a:effectRef idx="0">
+            <a:schemeClr val="accent1"/>
+          </a:effectRef>
+          <a:fontRef idx="minor">
+            <a:schemeClr val="lt1"/>
+          </a:fontRef>
+        </p:style>
+        <p:txBody>
+          <a:bodyPr rtlCol="0" anchor="ctr"/>
+          <a:lstStyle/>
+          <a:p>
+            <a:pPr algn="ctr"/>
+            <a:endParaRPr lang="en-CA">
+              <a:latin typeface="Consolas" panose="020B0609020204030204" pitchFamily="49" charset="0"/>
+            </a:endParaRPr>
+          </a:p>
+        </p:txBody>
+      </p:sp>
+      <p:sp>
+        <p:nvSpPr>
+          <p:cNvPr id="31" name="Oval 30">
+            <a:extLst>
+              <a:ext uri="{FF2B5EF4-FFF2-40B4-BE49-F238E27FC236}">
+                <a16:creationId xmlns:a16="http://schemas.microsoft.com/office/drawing/2014/main" id="{33525438-108E-42A8-A3A8-220D1DA04A77}"/>
+              </a:ext>
+            </a:extLst>
+          </p:cNvPr>
+          <p:cNvSpPr/>
+          <p:nvPr/>
+        </p:nvSpPr>
+        <p:spPr>
+          <a:xfrm>
+            <a:off x="1861045" y="1753846"/>
+            <a:ext cx="368736" cy="369333"/>
+          </a:xfrm>
+          <a:prstGeom prst="ellipse">
+            <a:avLst/>
+          </a:prstGeom>
+        </p:spPr>
+        <p:style>
+          <a:lnRef idx="2">
+            <a:schemeClr val="accent1">
+              <a:shade val="50000"/>
+            </a:schemeClr>
+          </a:lnRef>
+          <a:fillRef idx="1">
+            <a:schemeClr val="accent1"/>
+          </a:fillRef>
+          <a:effectRef idx="0">
+            <a:schemeClr val="accent1"/>
+          </a:effectRef>
+          <a:fontRef idx="minor">
+            <a:schemeClr val="lt1"/>
+          </a:fontRef>
+        </p:style>
+        <p:txBody>
+          <a:bodyPr rtlCol="0" anchor="ctr"/>
+          <a:lstStyle/>
+          <a:p>
+            <a:pPr algn="ctr"/>
+            <a:endParaRPr lang="en-CA">
+              <a:latin typeface="Consolas" panose="020B0609020204030204" pitchFamily="49" charset="0"/>
+            </a:endParaRPr>
+          </a:p>
+        </p:txBody>
+      </p:sp>
+      <p:sp>
+        <p:nvSpPr>
+          <p:cNvPr id="32" name="Oval 31">
+            <a:extLst>
+              <a:ext uri="{FF2B5EF4-FFF2-40B4-BE49-F238E27FC236}">
+                <a16:creationId xmlns:a16="http://schemas.microsoft.com/office/drawing/2014/main" id="{82475B4A-D6A9-4040-9E20-5A5144365377}"/>
+              </a:ext>
+            </a:extLst>
+          </p:cNvPr>
+          <p:cNvSpPr/>
+          <p:nvPr/>
+        </p:nvSpPr>
+        <p:spPr>
+          <a:xfrm>
+            <a:off x="295275" y="2284155"/>
+            <a:ext cx="368736" cy="369333"/>
+          </a:xfrm>
+          <a:prstGeom prst="ellipse">
+            <a:avLst/>
+          </a:prstGeom>
+        </p:spPr>
+        <p:style>
+          <a:lnRef idx="2">
+            <a:schemeClr val="accent1">
+              <a:shade val="50000"/>
+            </a:schemeClr>
+          </a:lnRef>
+          <a:fillRef idx="1">
+            <a:schemeClr val="accent1"/>
+          </a:fillRef>
+          <a:effectRef idx="0">
+            <a:schemeClr val="accent1"/>
+          </a:effectRef>
+          <a:fontRef idx="minor">
+            <a:schemeClr val="lt1"/>
+          </a:fontRef>
+        </p:style>
+        <p:txBody>
+          <a:bodyPr rtlCol="0" anchor="ctr"/>
+          <a:lstStyle/>
+          <a:p>
+            <a:pPr algn="ctr"/>
+            <a:endParaRPr lang="en-CA">
+              <a:latin typeface="Consolas" panose="020B0609020204030204" pitchFamily="49" charset="0"/>
+            </a:endParaRPr>
+          </a:p>
+        </p:txBody>
+      </p:sp>
+      <p:sp>
+        <p:nvSpPr>
+          <p:cNvPr id="33" name="Oval 32">
+            <a:extLst>
+              <a:ext uri="{FF2B5EF4-FFF2-40B4-BE49-F238E27FC236}">
+                <a16:creationId xmlns:a16="http://schemas.microsoft.com/office/drawing/2014/main" id="{CEDDB5DC-15C2-4B03-B317-4BAEFEFACB49}"/>
+              </a:ext>
+            </a:extLst>
+          </p:cNvPr>
+          <p:cNvSpPr/>
+          <p:nvPr/>
+        </p:nvSpPr>
+        <p:spPr>
+          <a:xfrm>
+            <a:off x="815217" y="2284155"/>
+            <a:ext cx="368736" cy="369333"/>
+          </a:xfrm>
+          <a:prstGeom prst="ellipse">
+            <a:avLst/>
+          </a:prstGeom>
+        </p:spPr>
+        <p:style>
+          <a:lnRef idx="2">
+            <a:schemeClr val="accent1">
+              <a:shade val="50000"/>
+            </a:schemeClr>
+          </a:lnRef>
+          <a:fillRef idx="1">
+            <a:schemeClr val="accent1"/>
+          </a:fillRef>
+          <a:effectRef idx="0">
+            <a:schemeClr val="accent1"/>
+          </a:effectRef>
+          <a:fontRef idx="minor">
+            <a:schemeClr val="lt1"/>
+          </a:fontRef>
+        </p:style>
+        <p:txBody>
+          <a:bodyPr rtlCol="0" anchor="ctr"/>
+          <a:lstStyle/>
+          <a:p>
+            <a:pPr algn="ctr"/>
+            <a:endParaRPr lang="en-CA">
+              <a:latin typeface="Consolas" panose="020B0609020204030204" pitchFamily="49" charset="0"/>
+            </a:endParaRPr>
+          </a:p>
+        </p:txBody>
+      </p:sp>
+      <p:sp>
+        <p:nvSpPr>
+          <p:cNvPr id="34" name="Oval 33">
+            <a:extLst>
+              <a:ext uri="{FF2B5EF4-FFF2-40B4-BE49-F238E27FC236}">
+                <a16:creationId xmlns:a16="http://schemas.microsoft.com/office/drawing/2014/main" id="{795A6712-924E-417A-A331-F3CCBA76DCA4}"/>
+              </a:ext>
+            </a:extLst>
+          </p:cNvPr>
+          <p:cNvSpPr/>
+          <p:nvPr/>
+        </p:nvSpPr>
+        <p:spPr>
+          <a:xfrm>
+            <a:off x="1341103" y="2284155"/>
+            <a:ext cx="368736" cy="369333"/>
+          </a:xfrm>
+          <a:prstGeom prst="ellipse">
+            <a:avLst/>
+          </a:prstGeom>
+        </p:spPr>
+        <p:style>
+          <a:lnRef idx="2">
+            <a:schemeClr val="accent1">
+              <a:shade val="50000"/>
+            </a:schemeClr>
+          </a:lnRef>
+          <a:fillRef idx="1">
+            <a:schemeClr val="accent1"/>
+          </a:fillRef>
+          <a:effectRef idx="0">
+            <a:schemeClr val="accent1"/>
+          </a:effectRef>
+          <a:fontRef idx="minor">
+            <a:schemeClr val="lt1"/>
+          </a:fontRef>
+        </p:style>
+        <p:txBody>
+          <a:bodyPr rtlCol="0" anchor="ctr"/>
+          <a:lstStyle/>
+          <a:p>
+            <a:pPr algn="ctr"/>
+            <a:endParaRPr lang="en-CA">
+              <a:latin typeface="Consolas" panose="020B0609020204030204" pitchFamily="49" charset="0"/>
+            </a:endParaRPr>
+          </a:p>
+        </p:txBody>
+      </p:sp>
+      <p:sp>
+        <p:nvSpPr>
+          <p:cNvPr id="35" name="Oval 34">
+            <a:extLst>
+              <a:ext uri="{FF2B5EF4-FFF2-40B4-BE49-F238E27FC236}">
+                <a16:creationId xmlns:a16="http://schemas.microsoft.com/office/drawing/2014/main" id="{1D510770-B835-4169-BA7D-47E30BC1B1C5}"/>
+              </a:ext>
+            </a:extLst>
+          </p:cNvPr>
+          <p:cNvSpPr/>
+          <p:nvPr/>
+        </p:nvSpPr>
+        <p:spPr>
+          <a:xfrm>
+            <a:off x="1861045" y="2284155"/>
+            <a:ext cx="368736" cy="369333"/>
+          </a:xfrm>
+          <a:prstGeom prst="ellipse">
+            <a:avLst/>
+          </a:prstGeom>
+        </p:spPr>
+        <p:style>
+          <a:lnRef idx="2">
+            <a:schemeClr val="accent1">
+              <a:shade val="50000"/>
+            </a:schemeClr>
+          </a:lnRef>
+          <a:fillRef idx="1">
+            <a:schemeClr val="accent1"/>
+          </a:fillRef>
+          <a:effectRef idx="0">
+            <a:schemeClr val="accent1"/>
+          </a:effectRef>
+          <a:fontRef idx="minor">
+            <a:schemeClr val="lt1"/>
+          </a:fontRef>
+        </p:style>
+        <p:txBody>
+          <a:bodyPr rtlCol="0" anchor="ctr"/>
+          <a:lstStyle/>
+          <a:p>
+            <a:pPr algn="ctr"/>
+            <a:endParaRPr lang="en-CA">
+              <a:latin typeface="Consolas" panose="020B0609020204030204" pitchFamily="49" charset="0"/>
+            </a:endParaRPr>
+          </a:p>
+        </p:txBody>
+      </p:sp>
+      <p:sp>
+        <p:nvSpPr>
+          <p:cNvPr id="36" name="Oval 35">
+            <a:extLst>
+              <a:ext uri="{FF2B5EF4-FFF2-40B4-BE49-F238E27FC236}">
+                <a16:creationId xmlns:a16="http://schemas.microsoft.com/office/drawing/2014/main" id="{A161D18A-C801-410E-9C14-63021B608905}"/>
+              </a:ext>
+            </a:extLst>
+          </p:cNvPr>
+          <p:cNvSpPr/>
+          <p:nvPr/>
+        </p:nvSpPr>
+        <p:spPr>
+          <a:xfrm>
+            <a:off x="295275" y="2807429"/>
+            <a:ext cx="368736" cy="369333"/>
+          </a:xfrm>
+          <a:prstGeom prst="ellipse">
+            <a:avLst/>
+          </a:prstGeom>
+        </p:spPr>
+        <p:style>
+          <a:lnRef idx="2">
+            <a:schemeClr val="accent1">
+              <a:shade val="50000"/>
+            </a:schemeClr>
+          </a:lnRef>
+          <a:fillRef idx="1">
+            <a:schemeClr val="accent1"/>
+          </a:fillRef>
+          <a:effectRef idx="0">
+            <a:schemeClr val="accent1"/>
+          </a:effectRef>
+          <a:fontRef idx="minor">
+            <a:schemeClr val="lt1"/>
+          </a:fontRef>
+        </p:style>
+        <p:txBody>
+          <a:bodyPr rtlCol="0" anchor="ctr"/>
+          <a:lstStyle/>
+          <a:p>
+            <a:pPr algn="ctr"/>
+            <a:endParaRPr lang="en-CA">
+              <a:latin typeface="Consolas" panose="020B0609020204030204" pitchFamily="49" charset="0"/>
+            </a:endParaRPr>
+          </a:p>
+        </p:txBody>
+      </p:sp>
+      <p:sp>
+        <p:nvSpPr>
+          <p:cNvPr id="37" name="Oval 36">
+            <a:extLst>
+              <a:ext uri="{FF2B5EF4-FFF2-40B4-BE49-F238E27FC236}">
+                <a16:creationId xmlns:a16="http://schemas.microsoft.com/office/drawing/2014/main" id="{32EB4298-5533-4310-9368-C89402FB2A70}"/>
+              </a:ext>
+            </a:extLst>
+          </p:cNvPr>
+          <p:cNvSpPr/>
+          <p:nvPr/>
+        </p:nvSpPr>
+        <p:spPr>
+          <a:xfrm>
+            <a:off x="815217" y="2807429"/>
+            <a:ext cx="368736" cy="369333"/>
+          </a:xfrm>
+          <a:prstGeom prst="ellipse">
+            <a:avLst/>
+          </a:prstGeom>
+        </p:spPr>
+        <p:style>
+          <a:lnRef idx="2">
+            <a:schemeClr val="accent1">
+              <a:shade val="50000"/>
+            </a:schemeClr>
+          </a:lnRef>
+          <a:fillRef idx="1">
+            <a:schemeClr val="accent1"/>
+          </a:fillRef>
+          <a:effectRef idx="0">
+            <a:schemeClr val="accent1"/>
+          </a:effectRef>
+          <a:fontRef idx="minor">
+            <a:schemeClr val="lt1"/>
+          </a:fontRef>
+        </p:style>
+        <p:txBody>
+          <a:bodyPr rtlCol="0" anchor="ctr"/>
+          <a:lstStyle/>
+          <a:p>
+            <a:pPr algn="ctr"/>
+            <a:endParaRPr lang="en-CA">
+              <a:latin typeface="Consolas" panose="020B0609020204030204" pitchFamily="49" charset="0"/>
+            </a:endParaRPr>
+          </a:p>
+        </p:txBody>
+      </p:sp>
+      <p:sp>
+        <p:nvSpPr>
+          <p:cNvPr id="38" name="Oval 37">
+            <a:extLst>
+              <a:ext uri="{FF2B5EF4-FFF2-40B4-BE49-F238E27FC236}">
+                <a16:creationId xmlns:a16="http://schemas.microsoft.com/office/drawing/2014/main" id="{9E86D486-DD80-4ED5-BD9F-AA67220BA32E}"/>
+              </a:ext>
+            </a:extLst>
+          </p:cNvPr>
+          <p:cNvSpPr/>
+          <p:nvPr/>
+        </p:nvSpPr>
+        <p:spPr>
+          <a:xfrm>
+            <a:off x="1341103" y="2807429"/>
+            <a:ext cx="368736" cy="369333"/>
+          </a:xfrm>
+          <a:prstGeom prst="ellipse">
+            <a:avLst/>
+          </a:prstGeom>
+        </p:spPr>
+        <p:style>
+          <a:lnRef idx="2">
+            <a:schemeClr val="accent1">
+              <a:shade val="50000"/>
+            </a:schemeClr>
+          </a:lnRef>
+          <a:fillRef idx="1">
+            <a:schemeClr val="accent1"/>
+          </a:fillRef>
+          <a:effectRef idx="0">
+            <a:schemeClr val="accent1"/>
+          </a:effectRef>
+          <a:fontRef idx="minor">
+            <a:schemeClr val="lt1"/>
+          </a:fontRef>
+        </p:style>
+        <p:txBody>
+          <a:bodyPr rtlCol="0" anchor="ctr"/>
+          <a:lstStyle/>
+          <a:p>
+            <a:pPr algn="ctr"/>
+            <a:endParaRPr lang="en-CA">
+              <a:latin typeface="Consolas" panose="020B0609020204030204" pitchFamily="49" charset="0"/>
+            </a:endParaRPr>
+          </a:p>
+        </p:txBody>
+      </p:sp>
+      <p:sp>
+        <p:nvSpPr>
+          <p:cNvPr id="39" name="Oval 38">
+            <a:extLst>
+              <a:ext uri="{FF2B5EF4-FFF2-40B4-BE49-F238E27FC236}">
+                <a16:creationId xmlns:a16="http://schemas.microsoft.com/office/drawing/2014/main" id="{AA14FD37-70AF-4822-9C76-DAD301DF0F7A}"/>
+              </a:ext>
+            </a:extLst>
+          </p:cNvPr>
+          <p:cNvSpPr/>
+          <p:nvPr/>
+        </p:nvSpPr>
+        <p:spPr>
+          <a:xfrm>
+            <a:off x="1861045" y="2807429"/>
+            <a:ext cx="368736" cy="369333"/>
+          </a:xfrm>
+          <a:prstGeom prst="ellipse">
+            <a:avLst/>
+          </a:prstGeom>
+        </p:spPr>
+        <p:style>
+          <a:lnRef idx="2">
+            <a:schemeClr val="accent1">
+              <a:shade val="50000"/>
+            </a:schemeClr>
+          </a:lnRef>
+          <a:fillRef idx="1">
+            <a:schemeClr val="accent1"/>
+          </a:fillRef>
+          <a:effectRef idx="0">
+            <a:schemeClr val="accent1"/>
+          </a:effectRef>
+          <a:fontRef idx="minor">
+            <a:schemeClr val="lt1"/>
+          </a:fontRef>
+        </p:style>
+        <p:txBody>
+          <a:bodyPr rtlCol="0" anchor="ctr"/>
+          <a:lstStyle/>
+          <a:p>
+            <a:pPr algn="ctr"/>
+            <a:endParaRPr lang="en-CA">
+              <a:latin typeface="Consolas" panose="020B0609020204030204" pitchFamily="49" charset="0"/>
+            </a:endParaRPr>
+          </a:p>
+        </p:txBody>
+      </p:sp>
+      <p:sp>
+        <p:nvSpPr>
+          <p:cNvPr id="40" name="Oval 39">
+            <a:extLst>
+              <a:ext uri="{FF2B5EF4-FFF2-40B4-BE49-F238E27FC236}">
+                <a16:creationId xmlns:a16="http://schemas.microsoft.com/office/drawing/2014/main" id="{38F58737-5A9C-4616-8C59-5DE5C3233F90}"/>
+              </a:ext>
+            </a:extLst>
+          </p:cNvPr>
+          <p:cNvSpPr/>
+          <p:nvPr/>
+        </p:nvSpPr>
+        <p:spPr>
+          <a:xfrm>
+            <a:off x="295275" y="3337738"/>
+            <a:ext cx="368736" cy="369333"/>
+          </a:xfrm>
+          <a:prstGeom prst="ellipse">
+            <a:avLst/>
+          </a:prstGeom>
+        </p:spPr>
+        <p:style>
+          <a:lnRef idx="2">
+            <a:schemeClr val="accent1">
+              <a:shade val="50000"/>
+            </a:schemeClr>
+          </a:lnRef>
+          <a:fillRef idx="1">
+            <a:schemeClr val="accent1"/>
+          </a:fillRef>
+          <a:effectRef idx="0">
+            <a:schemeClr val="accent1"/>
+          </a:effectRef>
+          <a:fontRef idx="minor">
+            <a:schemeClr val="lt1"/>
+          </a:fontRef>
+        </p:style>
+        <p:txBody>
+          <a:bodyPr rtlCol="0" anchor="ctr"/>
+          <a:lstStyle/>
+          <a:p>
+            <a:pPr algn="ctr"/>
+            <a:endParaRPr lang="en-CA">
+              <a:latin typeface="Consolas" panose="020B0609020204030204" pitchFamily="49" charset="0"/>
+            </a:endParaRPr>
+          </a:p>
+        </p:txBody>
+      </p:sp>
+      <p:sp>
+        <p:nvSpPr>
+          <p:cNvPr id="41" name="Oval 40">
+            <a:extLst>
+              <a:ext uri="{FF2B5EF4-FFF2-40B4-BE49-F238E27FC236}">
+                <a16:creationId xmlns:a16="http://schemas.microsoft.com/office/drawing/2014/main" id="{CA6DD7F7-9F5C-45B6-843A-D50A589F692B}"/>
+              </a:ext>
+            </a:extLst>
+          </p:cNvPr>
+          <p:cNvSpPr/>
+          <p:nvPr/>
+        </p:nvSpPr>
+        <p:spPr>
+          <a:xfrm>
+            <a:off x="815217" y="3337738"/>
+            <a:ext cx="368736" cy="369333"/>
+          </a:xfrm>
+          <a:prstGeom prst="ellipse">
+            <a:avLst/>
+          </a:prstGeom>
+        </p:spPr>
+        <p:style>
+          <a:lnRef idx="2">
+            <a:schemeClr val="accent1">
+              <a:shade val="50000"/>
+            </a:schemeClr>
+          </a:lnRef>
+          <a:fillRef idx="1">
+            <a:schemeClr val="accent1"/>
+          </a:fillRef>
+          <a:effectRef idx="0">
+            <a:schemeClr val="accent1"/>
+          </a:effectRef>
+          <a:fontRef idx="minor">
+            <a:schemeClr val="lt1"/>
+          </a:fontRef>
+        </p:style>
+        <p:txBody>
+          <a:bodyPr rtlCol="0" anchor="ctr"/>
+          <a:lstStyle/>
+          <a:p>
+            <a:pPr algn="ctr"/>
+            <a:endParaRPr lang="en-CA">
+              <a:latin typeface="Consolas" panose="020B0609020204030204" pitchFamily="49" charset="0"/>
+            </a:endParaRPr>
+          </a:p>
+        </p:txBody>
+      </p:sp>
+      <p:sp>
+        <p:nvSpPr>
+          <p:cNvPr id="42" name="Oval 41">
+            <a:extLst>
+              <a:ext uri="{FF2B5EF4-FFF2-40B4-BE49-F238E27FC236}">
+                <a16:creationId xmlns:a16="http://schemas.microsoft.com/office/drawing/2014/main" id="{D4352877-28B1-4627-B730-DF040E1F54C4}"/>
+              </a:ext>
+            </a:extLst>
+          </p:cNvPr>
+          <p:cNvSpPr/>
+          <p:nvPr/>
+        </p:nvSpPr>
+        <p:spPr>
+          <a:xfrm>
+            <a:off x="1341103" y="3337738"/>
+            <a:ext cx="368736" cy="369333"/>
+          </a:xfrm>
+          <a:prstGeom prst="ellipse">
+            <a:avLst/>
+          </a:prstGeom>
+        </p:spPr>
+        <p:style>
+          <a:lnRef idx="2">
+            <a:schemeClr val="accent1">
+              <a:shade val="50000"/>
+            </a:schemeClr>
+          </a:lnRef>
+          <a:fillRef idx="1">
+            <a:schemeClr val="accent1"/>
+          </a:fillRef>
+          <a:effectRef idx="0">
+            <a:schemeClr val="accent1"/>
+          </a:effectRef>
+          <a:fontRef idx="minor">
+            <a:schemeClr val="lt1"/>
+          </a:fontRef>
+        </p:style>
+        <p:txBody>
+          <a:bodyPr rtlCol="0" anchor="ctr"/>
+          <a:lstStyle/>
+          <a:p>
+            <a:pPr algn="ctr"/>
+            <a:endParaRPr lang="en-CA">
+              <a:latin typeface="Consolas" panose="020B0609020204030204" pitchFamily="49" charset="0"/>
+            </a:endParaRPr>
+          </a:p>
+        </p:txBody>
+      </p:sp>
+      <p:sp>
+        <p:nvSpPr>
+          <p:cNvPr id="43" name="Oval 42">
+            <a:extLst>
+              <a:ext uri="{FF2B5EF4-FFF2-40B4-BE49-F238E27FC236}">
+                <a16:creationId xmlns:a16="http://schemas.microsoft.com/office/drawing/2014/main" id="{F4B0B946-8F9C-4D49-942A-FD475129E873}"/>
+              </a:ext>
+            </a:extLst>
+          </p:cNvPr>
+          <p:cNvSpPr/>
+          <p:nvPr/>
+        </p:nvSpPr>
+        <p:spPr>
+          <a:xfrm>
+            <a:off x="1861045" y="3337738"/>
+            <a:ext cx="368736" cy="369333"/>
+          </a:xfrm>
+          <a:prstGeom prst="ellipse">
+            <a:avLst/>
+          </a:prstGeom>
+        </p:spPr>
+        <p:style>
+          <a:lnRef idx="2">
+            <a:schemeClr val="accent1">
+              <a:shade val="50000"/>
+            </a:schemeClr>
+          </a:lnRef>
+          <a:fillRef idx="1">
+            <a:schemeClr val="accent1"/>
+          </a:fillRef>
+          <a:effectRef idx="0">
+            <a:schemeClr val="accent1"/>
+          </a:effectRef>
+          <a:fontRef idx="minor">
+            <a:schemeClr val="lt1"/>
+          </a:fontRef>
+        </p:style>
+        <p:txBody>
+          <a:bodyPr rtlCol="0" anchor="ctr"/>
+          <a:lstStyle/>
+          <a:p>
+            <a:pPr algn="ctr"/>
+            <a:endParaRPr lang="en-CA">
+              <a:latin typeface="Consolas" panose="020B0609020204030204" pitchFamily="49" charset="0"/>
+            </a:endParaRPr>
+          </a:p>
+        </p:txBody>
+      </p:sp>
+      <p:sp>
+        <p:nvSpPr>
+          <p:cNvPr id="44" name="Oval 43">
+            <a:extLst>
+              <a:ext uri="{FF2B5EF4-FFF2-40B4-BE49-F238E27FC236}">
+                <a16:creationId xmlns:a16="http://schemas.microsoft.com/office/drawing/2014/main" id="{19DC4DCC-18E6-4E0E-B79B-ED15371BF0DC}"/>
+              </a:ext>
+            </a:extLst>
+          </p:cNvPr>
+          <p:cNvSpPr/>
+          <p:nvPr/>
+        </p:nvSpPr>
+        <p:spPr>
+          <a:xfrm>
+            <a:off x="1082617" y="1157606"/>
+            <a:ext cx="368736" cy="369333"/>
+          </a:xfrm>
+          <a:prstGeom prst="ellipse">
+            <a:avLst/>
+          </a:prstGeom>
+        </p:spPr>
+        <p:style>
+          <a:lnRef idx="2">
+            <a:schemeClr val="accent1">
+              <a:shade val="50000"/>
+            </a:schemeClr>
+          </a:lnRef>
+          <a:fillRef idx="1">
+            <a:schemeClr val="accent1"/>
+          </a:fillRef>
+          <a:effectRef idx="0">
+            <a:schemeClr val="accent1"/>
+          </a:effectRef>
+          <a:fontRef idx="minor">
+            <a:schemeClr val="lt1"/>
+          </a:fontRef>
+        </p:style>
+        <p:txBody>
+          <a:bodyPr rtlCol="0" anchor="ctr"/>
+          <a:lstStyle/>
+          <a:p>
+            <a:pPr algn="ctr"/>
+            <a:endParaRPr lang="en-CA">
+              <a:latin typeface="Consolas" panose="020B0609020204030204" pitchFamily="49" charset="0"/>
+            </a:endParaRPr>
+          </a:p>
+        </p:txBody>
+      </p:sp>
+      <p:sp>
+        <p:nvSpPr>
+          <p:cNvPr id="45" name="Oval 44">
+            <a:extLst>
+              <a:ext uri="{FF2B5EF4-FFF2-40B4-BE49-F238E27FC236}">
+                <a16:creationId xmlns:a16="http://schemas.microsoft.com/office/drawing/2014/main" id="{C12E5EB5-D547-4A38-BA0A-C58351A68E85}"/>
+              </a:ext>
+            </a:extLst>
+          </p:cNvPr>
+          <p:cNvSpPr/>
+          <p:nvPr/>
+        </p:nvSpPr>
+        <p:spPr>
+          <a:xfrm>
+            <a:off x="1082617" y="3952351"/>
+            <a:ext cx="368736" cy="369333"/>
+          </a:xfrm>
+          <a:prstGeom prst="ellipse">
+            <a:avLst/>
+          </a:prstGeom>
+        </p:spPr>
+        <p:style>
+          <a:lnRef idx="2">
+            <a:schemeClr val="accent1">
+              <a:shade val="50000"/>
+            </a:schemeClr>
+          </a:lnRef>
+          <a:fillRef idx="1">
+            <a:schemeClr val="accent1"/>
+          </a:fillRef>
+          <a:effectRef idx="0">
+            <a:schemeClr val="accent1"/>
+          </a:effectRef>
+          <a:fontRef idx="minor">
+            <a:schemeClr val="lt1"/>
+          </a:fontRef>
+        </p:style>
+        <p:txBody>
+          <a:bodyPr rtlCol="0" anchor="ctr"/>
+          <a:lstStyle/>
+          <a:p>
+            <a:pPr algn="ctr"/>
+            <a:endParaRPr lang="en-CA">
+              <a:latin typeface="Consolas" panose="020B0609020204030204" pitchFamily="49" charset="0"/>
+            </a:endParaRPr>
+          </a:p>
+        </p:txBody>
+      </p:sp>
+      <p:sp>
+        <p:nvSpPr>
+          <p:cNvPr id="46" name="TextBox 45">
+            <a:extLst>
+              <a:ext uri="{FF2B5EF4-FFF2-40B4-BE49-F238E27FC236}">
+                <a16:creationId xmlns:a16="http://schemas.microsoft.com/office/drawing/2014/main" id="{7B07CCDF-84A8-485B-BF12-9FB4FD64AD48}"/>
+              </a:ext>
+            </a:extLst>
+          </p:cNvPr>
+          <p:cNvSpPr txBox="1"/>
+          <p:nvPr/>
+        </p:nvSpPr>
+        <p:spPr>
+          <a:xfrm>
+            <a:off x="650433" y="996630"/>
+            <a:ext cx="531139" cy="261610"/>
+          </a:xfrm>
+          <a:prstGeom prst="rect">
+            <a:avLst/>
+          </a:prstGeom>
+          <a:noFill/>
+          <a:ln w="28575">
+            <a:solidFill>
+              <a:schemeClr val="tx1"/>
+            </a:solidFill>
+            <a:prstDash val="sysDash"/>
+          </a:ln>
+        </p:spPr>
+        <p:txBody>
+          <a:bodyPr wrap="square" rtlCol="0">
+            <a:spAutoFit/>
+          </a:bodyPr>
+          <a:lstStyle/>
+          <a:p>
+            <a:pPr algn="ctr"/>
+            <a:r>
+              <a:rPr lang="en-CA" sz="1100">
+                <a:latin typeface="Consolas" panose="020B0609020204030204" pitchFamily="49" charset="0"/>
+              </a:rPr>
+              <a:t>in</a:t>
+            </a:r>
+          </a:p>
+        </p:txBody>
+      </p:sp>
+      <p:sp>
+        <p:nvSpPr>
+          <p:cNvPr id="47" name="TextBox 46">
+            <a:extLst>
+              <a:ext uri="{FF2B5EF4-FFF2-40B4-BE49-F238E27FC236}">
+                <a16:creationId xmlns:a16="http://schemas.microsoft.com/office/drawing/2014/main" id="{45D74D6C-E435-4E66-B360-9A648B4D093F}"/>
+              </a:ext>
+            </a:extLst>
+          </p:cNvPr>
+          <p:cNvSpPr txBox="1"/>
+          <p:nvPr/>
+        </p:nvSpPr>
+        <p:spPr>
+          <a:xfrm>
+            <a:off x="1401464" y="4167859"/>
+            <a:ext cx="531139" cy="261610"/>
+          </a:xfrm>
+          <a:prstGeom prst="rect">
+            <a:avLst/>
+          </a:prstGeom>
+          <a:noFill/>
+          <a:ln w="28575">
+            <a:solidFill>
+              <a:schemeClr val="tx1"/>
+            </a:solidFill>
+            <a:prstDash val="sysDash"/>
+          </a:ln>
+        </p:spPr>
+        <p:txBody>
+          <a:bodyPr wrap="square" rtlCol="0">
+            <a:spAutoFit/>
+          </a:bodyPr>
+          <a:lstStyle/>
+          <a:p>
+            <a:pPr algn="ctr"/>
+            <a:r>
+              <a:rPr lang="en-CA" sz="1100">
+                <a:latin typeface="Consolas" panose="020B0609020204030204" pitchFamily="49" charset="0"/>
+              </a:rPr>
+              <a:t>out</a:t>
+            </a:r>
+          </a:p>
+        </p:txBody>
+      </p:sp>
+      <p:grpSp>
+        <p:nvGrpSpPr>
+          <p:cNvPr id="61" name="Group 60">
+            <a:extLst>
+              <a:ext uri="{FF2B5EF4-FFF2-40B4-BE49-F238E27FC236}">
+                <a16:creationId xmlns:a16="http://schemas.microsoft.com/office/drawing/2014/main" id="{295463F1-3C56-4BEE-9DD6-15FC0C339CF8}"/>
+              </a:ext>
+            </a:extLst>
+          </p:cNvPr>
+          <p:cNvGrpSpPr/>
+          <p:nvPr/>
+        </p:nvGrpSpPr>
+        <p:grpSpPr>
+          <a:xfrm>
+            <a:off x="1551707" y="1131987"/>
+            <a:ext cx="4585204" cy="2304335"/>
+            <a:chOff x="2659561" y="1340292"/>
+            <a:chExt cx="4585204" cy="2304335"/>
+          </a:xfrm>
+        </p:grpSpPr>
+        <p:sp>
+          <p:nvSpPr>
+            <p:cNvPr id="7" name="Oval 6">
+              <a:extLst>
+                <a:ext uri="{FF2B5EF4-FFF2-40B4-BE49-F238E27FC236}">
+                  <a16:creationId xmlns:a16="http://schemas.microsoft.com/office/drawing/2014/main" id="{C601FE52-7329-4015-9EAF-BE54FB338221}"/>
+                </a:ext>
+              </a:extLst>
+            </p:cNvPr>
+            <p:cNvSpPr/>
+            <p:nvPr/>
+          </p:nvSpPr>
+          <p:spPr>
+            <a:xfrm>
+              <a:off x="5244515" y="1777727"/>
+              <a:ext cx="2000250" cy="1866900"/>
+            </a:xfrm>
+            <a:prstGeom prst="ellipse">
+              <a:avLst/>
+            </a:prstGeom>
+          </p:spPr>
+          <p:style>
+            <a:lnRef idx="2">
+              <a:schemeClr val="accent1">
+                <a:shade val="50000"/>
+              </a:schemeClr>
+            </a:lnRef>
+            <a:fillRef idx="1">
+              <a:schemeClr val="accent1"/>
+            </a:fillRef>
+            <a:effectRef idx="0">
+              <a:schemeClr val="accent1"/>
+            </a:effectRef>
+            <a:fontRef idx="minor">
+              <a:schemeClr val="lt1"/>
+            </a:fontRef>
+          </p:style>
+          <p:txBody>
+            <a:bodyPr rtlCol="0" anchor="ctr"/>
+            <a:lstStyle/>
+            <a:p>
+              <a:pPr algn="ctr"/>
+              <a:endParaRPr lang="en-CA">
+                <a:latin typeface="Consolas" panose="020B0609020204030204" pitchFamily="49" charset="0"/>
+              </a:endParaRPr>
+            </a:p>
+          </p:txBody>
+        </p:sp>
+        <p:grpSp>
+          <p:nvGrpSpPr>
+            <p:cNvPr id="53" name="Group 52">
+              <a:extLst>
+                <a:ext uri="{FF2B5EF4-FFF2-40B4-BE49-F238E27FC236}">
+                  <a16:creationId xmlns:a16="http://schemas.microsoft.com/office/drawing/2014/main" id="{AB8F07F4-AFF0-420B-A032-9ED9B0C5A754}"/>
+                </a:ext>
+              </a:extLst>
+            </p:cNvPr>
+            <p:cNvGrpSpPr/>
+            <p:nvPr/>
+          </p:nvGrpSpPr>
+          <p:grpSpPr>
+            <a:xfrm>
+              <a:off x="2659561" y="1340292"/>
+              <a:ext cx="2584955" cy="1370883"/>
+              <a:chOff x="3038257" y="1336480"/>
+              <a:chExt cx="1997704" cy="940781"/>
+            </a:xfrm>
+          </p:grpSpPr>
+          <p:cxnSp>
+            <p:nvCxnSpPr>
+              <p:cNvPr id="49" name="Connector: Elbow 48">
+                <a:extLst>
+                  <a:ext uri="{FF2B5EF4-FFF2-40B4-BE49-F238E27FC236}">
+                    <a16:creationId xmlns:a16="http://schemas.microsoft.com/office/drawing/2014/main" id="{C4601A3B-94C9-4CDD-936F-9E1FA9ABBFA2}"/>
+                  </a:ext>
+                </a:extLst>
+              </p:cNvPr>
+              <p:cNvCxnSpPr>
+                <a:cxnSpLocks/>
+                <a:endCxn id="7" idx="2"/>
+              </p:cNvCxnSpPr>
+              <p:nvPr/>
+            </p:nvCxnSpPr>
+            <p:spPr>
+              <a:xfrm>
+                <a:off x="3038257" y="1467828"/>
+                <a:ext cx="1997704" cy="809433"/>
+              </a:xfrm>
+              <a:prstGeom prst="bentConnector3">
+                <a:avLst>
+                  <a:gd name="adj1" fmla="val 50000"/>
+                </a:avLst>
+              </a:prstGeom>
+              <a:ln>
+                <a:solidFill>
+                  <a:schemeClr val="tx1"/>
+                </a:solidFill>
+                <a:tailEnd type="triangle"/>
+              </a:ln>
+            </p:spPr>
+            <p:style>
+              <a:lnRef idx="1">
+                <a:schemeClr val="accent1"/>
+              </a:lnRef>
+              <a:fillRef idx="0">
+                <a:schemeClr val="accent1"/>
+              </a:fillRef>
+              <a:effectRef idx="0">
+                <a:schemeClr val="accent1"/>
+              </a:effectRef>
+              <a:fontRef idx="minor">
+                <a:schemeClr val="tx1"/>
+              </a:fontRef>
+            </p:style>
+          </p:cxnSp>
+          <p:cxnSp>
+            <p:nvCxnSpPr>
+              <p:cNvPr id="52" name="Straight Connector 51">
+                <a:extLst>
+                  <a:ext uri="{FF2B5EF4-FFF2-40B4-BE49-F238E27FC236}">
+                    <a16:creationId xmlns:a16="http://schemas.microsoft.com/office/drawing/2014/main" id="{612DA9F6-D46F-4582-8E33-C324E83132FC}"/>
+                  </a:ext>
+                </a:extLst>
+              </p:cNvPr>
+              <p:cNvCxnSpPr/>
+              <p:nvPr/>
+            </p:nvCxnSpPr>
+            <p:spPr>
+              <a:xfrm>
+                <a:off x="3038257" y="1336480"/>
+                <a:ext cx="0" cy="262696"/>
+              </a:xfrm>
+              <a:prstGeom prst="line">
+                <a:avLst/>
+              </a:prstGeom>
+              <a:ln>
+                <a:solidFill>
+                  <a:schemeClr val="tx1"/>
+                </a:solidFill>
+              </a:ln>
+            </p:spPr>
+            <p:style>
+              <a:lnRef idx="1">
+                <a:schemeClr val="accent1"/>
+              </a:lnRef>
+              <a:fillRef idx="0">
+                <a:schemeClr val="accent1"/>
+              </a:fillRef>
+              <a:effectRef idx="0">
+                <a:schemeClr val="accent1"/>
+              </a:effectRef>
+              <a:fontRef idx="minor">
+                <a:schemeClr val="tx1"/>
+              </a:fontRef>
+            </p:style>
+          </p:cxnSp>
+        </p:grpSp>
+      </p:grpSp>
+      <p:sp>
+        <p:nvSpPr>
+          <p:cNvPr id="64" name="TextBox 63">
+            <a:extLst>
+              <a:ext uri="{FF2B5EF4-FFF2-40B4-BE49-F238E27FC236}">
+                <a16:creationId xmlns:a16="http://schemas.microsoft.com/office/drawing/2014/main" id="{E0E2F35B-CFAC-413E-80AA-4B9CBAC17F59}"/>
+              </a:ext>
+            </a:extLst>
+          </p:cNvPr>
+          <p:cNvSpPr txBox="1"/>
+          <p:nvPr/>
+        </p:nvSpPr>
+        <p:spPr>
+          <a:xfrm>
+            <a:off x="7982824" y="341512"/>
+            <a:ext cx="2657469" cy="400110"/>
+          </a:xfrm>
+          <a:prstGeom prst="rect">
+            <a:avLst/>
+          </a:prstGeom>
+          <a:noFill/>
+          <a:ln w="28575">
+            <a:solidFill>
+              <a:schemeClr val="tx1"/>
+            </a:solidFill>
+            <a:prstDash val="sysDash"/>
+          </a:ln>
+        </p:spPr>
+        <p:txBody>
+          <a:bodyPr wrap="square" rtlCol="0">
+            <a:spAutoFit/>
+          </a:bodyPr>
+          <a:lstStyle/>
+          <a:p>
+            <a:r>
+              <a:rPr lang="en-CA" sz="1000">
+                <a:solidFill>
+                  <a:schemeClr val="accent4"/>
+                </a:solidFill>
+                <a:latin typeface="Consolas" panose="020B0609020204030204" pitchFamily="49" charset="0"/>
+              </a:rPr>
+              <a:t>Connection Attributes</a:t>
+            </a:r>
+          </a:p>
+          <a:p>
+            <a:r>
+              <a:rPr lang="en-CA" sz="1000">
+                <a:latin typeface="Consolas" panose="020B0609020204030204" pitchFamily="49" charset="0"/>
+              </a:rPr>
+              <a:t>potential</a:t>
+            </a:r>
+          </a:p>
+        </p:txBody>
+      </p:sp>
+      <p:cxnSp>
+        <p:nvCxnSpPr>
+          <p:cNvPr id="65" name="Straight Arrow Connector 64">
+            <a:extLst>
+              <a:ext uri="{FF2B5EF4-FFF2-40B4-BE49-F238E27FC236}">
+                <a16:creationId xmlns:a16="http://schemas.microsoft.com/office/drawing/2014/main" id="{79AD73B4-AABD-4E94-8910-98E2750BD120}"/>
+              </a:ext>
+            </a:extLst>
+          </p:cNvPr>
+          <p:cNvCxnSpPr>
+            <a:cxnSpLocks/>
+            <a:endCxn id="64" idx="1"/>
+          </p:cNvCxnSpPr>
+          <p:nvPr/>
+        </p:nvCxnSpPr>
+        <p:spPr>
+          <a:xfrm flipV="1">
+            <a:off x="5915082" y="541567"/>
+            <a:ext cx="2067742" cy="690365"/>
+          </a:xfrm>
+          <a:prstGeom prst="straightConnector1">
+            <a:avLst/>
+          </a:prstGeom>
+          <a:ln>
+            <a:solidFill>
+              <a:schemeClr val="tx1"/>
+            </a:solidFill>
+            <a:tailEnd type="triangle"/>
+          </a:ln>
+        </p:spPr>
+        <p:style>
+          <a:lnRef idx="1">
+            <a:schemeClr val="accent1"/>
+          </a:lnRef>
+          <a:fillRef idx="0">
+            <a:schemeClr val="accent1"/>
+          </a:fillRef>
+          <a:effectRef idx="0">
+            <a:schemeClr val="accent1"/>
+          </a:effectRef>
+          <a:fontRef idx="minor">
+            <a:schemeClr val="tx1"/>
+          </a:fontRef>
+        </p:style>
+      </p:cxnSp>
+      <p:cxnSp>
+        <p:nvCxnSpPr>
+          <p:cNvPr id="72" name="Straight Arrow Connector 71">
+            <a:extLst>
+              <a:ext uri="{FF2B5EF4-FFF2-40B4-BE49-F238E27FC236}">
+                <a16:creationId xmlns:a16="http://schemas.microsoft.com/office/drawing/2014/main" id="{6E20F13F-5014-41B8-B20E-3872A34EB09E}"/>
+              </a:ext>
+            </a:extLst>
+          </p:cNvPr>
+          <p:cNvCxnSpPr>
+            <a:cxnSpLocks/>
+          </p:cNvCxnSpPr>
+          <p:nvPr/>
+        </p:nvCxnSpPr>
+        <p:spPr>
+          <a:xfrm flipH="1">
+            <a:off x="5225141" y="1018814"/>
+            <a:ext cx="45599" cy="551969"/>
+          </a:xfrm>
+          <a:prstGeom prst="straightConnector1">
+            <a:avLst/>
+          </a:prstGeom>
+          <a:ln w="76200">
+            <a:solidFill>
+              <a:schemeClr val="accent5">
+                <a:lumMod val="60000"/>
+                <a:lumOff val="40000"/>
+              </a:schemeClr>
+            </a:solidFill>
+            <a:headEnd type="none" w="med" len="med"/>
+            <a:tailEnd type="arrow" w="med" len="med"/>
+          </a:ln>
+        </p:spPr>
+        <p:style>
+          <a:lnRef idx="1">
+            <a:schemeClr val="accent1"/>
+          </a:lnRef>
+          <a:fillRef idx="0">
+            <a:schemeClr val="accent1"/>
+          </a:fillRef>
+          <a:effectRef idx="0">
+            <a:schemeClr val="accent1"/>
+          </a:effectRef>
+          <a:fontRef idx="minor">
+            <a:schemeClr val="tx1"/>
+          </a:fontRef>
+        </p:style>
+      </p:cxnSp>
+      <p:cxnSp>
+        <p:nvCxnSpPr>
+          <p:cNvPr id="76" name="Straight Arrow Connector 75">
+            <a:extLst>
+              <a:ext uri="{FF2B5EF4-FFF2-40B4-BE49-F238E27FC236}">
+                <a16:creationId xmlns:a16="http://schemas.microsoft.com/office/drawing/2014/main" id="{9D648480-65A6-4405-BB5A-8158BAC7C231}"/>
+              </a:ext>
+            </a:extLst>
+          </p:cNvPr>
+          <p:cNvCxnSpPr>
+            <a:cxnSpLocks/>
+          </p:cNvCxnSpPr>
+          <p:nvPr/>
+        </p:nvCxnSpPr>
+        <p:spPr>
+          <a:xfrm flipH="1">
+            <a:off x="5579171" y="1093931"/>
+            <a:ext cx="260474" cy="596438"/>
+          </a:xfrm>
+          <a:prstGeom prst="straightConnector1">
+            <a:avLst/>
+          </a:prstGeom>
+          <a:ln w="76200">
+            <a:solidFill>
+              <a:schemeClr val="accent5">
+                <a:lumMod val="60000"/>
+                <a:lumOff val="40000"/>
+              </a:schemeClr>
+            </a:solidFill>
+            <a:headEnd type="none" w="med" len="med"/>
+            <a:tailEnd type="arrow" w="med" len="med"/>
+          </a:ln>
+        </p:spPr>
+        <p:style>
+          <a:lnRef idx="1">
+            <a:schemeClr val="accent1"/>
+          </a:lnRef>
+          <a:fillRef idx="0">
+            <a:schemeClr val="accent1"/>
+          </a:fillRef>
+          <a:effectRef idx="0">
+            <a:schemeClr val="accent1"/>
+          </a:effectRef>
+          <a:fontRef idx="minor">
+            <a:schemeClr val="tx1"/>
+          </a:fontRef>
+        </p:style>
+      </p:cxnSp>
+      <p:sp>
+        <p:nvSpPr>
+          <p:cNvPr id="78" name="Oval 77">
+            <a:extLst>
+              <a:ext uri="{FF2B5EF4-FFF2-40B4-BE49-F238E27FC236}">
+                <a16:creationId xmlns:a16="http://schemas.microsoft.com/office/drawing/2014/main" id="{D9A7F56F-9E85-40B5-B48B-D8C124C37BD1}"/>
+              </a:ext>
+            </a:extLst>
+          </p:cNvPr>
+          <p:cNvSpPr/>
+          <p:nvPr/>
+        </p:nvSpPr>
+        <p:spPr>
+          <a:xfrm>
+            <a:off x="4414961" y="586079"/>
+            <a:ext cx="492236" cy="493033"/>
+          </a:xfrm>
+          <a:prstGeom prst="ellipse">
+            <a:avLst/>
+          </a:prstGeom>
+        </p:spPr>
+        <p:style>
+          <a:lnRef idx="2">
+            <a:schemeClr val="accent1">
+              <a:shade val="50000"/>
+            </a:schemeClr>
+          </a:lnRef>
+          <a:fillRef idx="1">
+            <a:schemeClr val="accent1"/>
+          </a:fillRef>
+          <a:effectRef idx="0">
+            <a:schemeClr val="accent1"/>
+          </a:effectRef>
+          <a:fontRef idx="minor">
+            <a:schemeClr val="lt1"/>
+          </a:fontRef>
+        </p:style>
+        <p:txBody>
+          <a:bodyPr rtlCol="0" anchor="ctr"/>
+          <a:lstStyle/>
+          <a:p>
+            <a:pPr algn="ctr"/>
+            <a:endParaRPr lang="en-CA">
+              <a:latin typeface="Consolas" panose="020B0609020204030204" pitchFamily="49" charset="0"/>
+            </a:endParaRPr>
+          </a:p>
+        </p:txBody>
+      </p:sp>
+      <p:sp>
+        <p:nvSpPr>
+          <p:cNvPr id="79" name="Oval 78">
+            <a:extLst>
+              <a:ext uri="{FF2B5EF4-FFF2-40B4-BE49-F238E27FC236}">
+                <a16:creationId xmlns:a16="http://schemas.microsoft.com/office/drawing/2014/main" id="{0A09C984-4C2D-4003-8EEB-28266E4FB42E}"/>
+              </a:ext>
+            </a:extLst>
+          </p:cNvPr>
+          <p:cNvSpPr/>
+          <p:nvPr/>
+        </p:nvSpPr>
+        <p:spPr>
+          <a:xfrm>
+            <a:off x="5059303" y="552838"/>
+            <a:ext cx="492236" cy="493033"/>
+          </a:xfrm>
+          <a:prstGeom prst="ellipse">
+            <a:avLst/>
+          </a:prstGeom>
+        </p:spPr>
+        <p:style>
+          <a:lnRef idx="2">
+            <a:schemeClr val="accent1">
+              <a:shade val="50000"/>
+            </a:schemeClr>
+          </a:lnRef>
+          <a:fillRef idx="1">
+            <a:schemeClr val="accent1"/>
+          </a:fillRef>
+          <a:effectRef idx="0">
+            <a:schemeClr val="accent1"/>
+          </a:effectRef>
+          <a:fontRef idx="minor">
+            <a:schemeClr val="lt1"/>
+          </a:fontRef>
+        </p:style>
+        <p:txBody>
+          <a:bodyPr rtlCol="0" anchor="ctr"/>
+          <a:lstStyle/>
+          <a:p>
+            <a:pPr algn="ctr"/>
+            <a:endParaRPr lang="en-CA">
+              <a:latin typeface="Consolas" panose="020B0609020204030204" pitchFamily="49" charset="0"/>
+            </a:endParaRPr>
+          </a:p>
+        </p:txBody>
+      </p:sp>
+      <p:sp>
+        <p:nvSpPr>
+          <p:cNvPr id="85" name="Oval 84">
+            <a:extLst>
+              <a:ext uri="{FF2B5EF4-FFF2-40B4-BE49-F238E27FC236}">
+                <a16:creationId xmlns:a16="http://schemas.microsoft.com/office/drawing/2014/main" id="{C329C1AD-C3A1-4951-B1A7-FE4DFAD9AFA5}"/>
+              </a:ext>
+            </a:extLst>
+          </p:cNvPr>
+          <p:cNvSpPr/>
+          <p:nvPr/>
+        </p:nvSpPr>
+        <p:spPr>
+          <a:xfrm>
+            <a:off x="5668964" y="618704"/>
+            <a:ext cx="492236" cy="493033"/>
+          </a:xfrm>
+          <a:prstGeom prst="ellipse">
+            <a:avLst/>
+          </a:prstGeom>
+        </p:spPr>
+        <p:style>
+          <a:lnRef idx="2">
+            <a:schemeClr val="accent1">
+              <a:shade val="50000"/>
+            </a:schemeClr>
+          </a:lnRef>
+          <a:fillRef idx="1">
+            <a:schemeClr val="accent1"/>
+          </a:fillRef>
+          <a:effectRef idx="0">
+            <a:schemeClr val="accent1"/>
+          </a:effectRef>
+          <a:fontRef idx="minor">
+            <a:schemeClr val="lt1"/>
+          </a:fontRef>
+        </p:style>
+        <p:txBody>
+          <a:bodyPr rtlCol="0" anchor="ctr"/>
+          <a:lstStyle/>
+          <a:p>
+            <a:pPr algn="ctr"/>
+            <a:endParaRPr lang="en-CA">
+              <a:latin typeface="Consolas" panose="020B0609020204030204" pitchFamily="49" charset="0"/>
+            </a:endParaRPr>
+          </a:p>
+        </p:txBody>
+      </p:sp>
+      <p:sp>
+        <p:nvSpPr>
+          <p:cNvPr id="86" name="TextBox 85">
+            <a:extLst>
+              <a:ext uri="{FF2B5EF4-FFF2-40B4-BE49-F238E27FC236}">
+                <a16:creationId xmlns:a16="http://schemas.microsoft.com/office/drawing/2014/main" id="{2B48FCB0-8AC5-4AA2-B8CD-2B2BC6492D60}"/>
+              </a:ext>
+            </a:extLst>
+          </p:cNvPr>
+          <p:cNvSpPr txBox="1"/>
+          <p:nvPr/>
+        </p:nvSpPr>
+        <p:spPr>
+          <a:xfrm>
+            <a:off x="2155063" y="3565595"/>
+            <a:ext cx="785511" cy="261610"/>
+          </a:xfrm>
+          <a:prstGeom prst="rect">
+            <a:avLst/>
+          </a:prstGeom>
+          <a:noFill/>
+          <a:ln w="28575">
+            <a:solidFill>
+              <a:schemeClr val="tx1"/>
+            </a:solidFill>
+            <a:prstDash val="sysDash"/>
+          </a:ln>
+        </p:spPr>
+        <p:txBody>
+          <a:bodyPr wrap="square" rtlCol="0">
+            <a:spAutoFit/>
+          </a:bodyPr>
+          <a:lstStyle/>
+          <a:p>
+            <a:pPr algn="ctr"/>
+            <a:r>
+              <a:rPr lang="en-CA" sz="1100">
+                <a:latin typeface="Consolas" panose="020B0609020204030204" pitchFamily="49" charset="0"/>
+              </a:rPr>
+              <a:t>hidden</a:t>
+            </a:r>
+          </a:p>
+        </p:txBody>
+      </p:sp>
+      <p:sp>
+        <p:nvSpPr>
+          <p:cNvPr id="87" name="TextBox 86">
+            <a:extLst>
+              <a:ext uri="{FF2B5EF4-FFF2-40B4-BE49-F238E27FC236}">
+                <a16:creationId xmlns:a16="http://schemas.microsoft.com/office/drawing/2014/main" id="{1EB05ED1-ED63-4D68-93B9-15CF026A2948}"/>
+              </a:ext>
+            </a:extLst>
+          </p:cNvPr>
+          <p:cNvSpPr txBox="1"/>
+          <p:nvPr/>
+        </p:nvSpPr>
+        <p:spPr>
+          <a:xfrm>
+            <a:off x="4515670" y="116570"/>
+            <a:ext cx="1323975" cy="369332"/>
+          </a:xfrm>
+          <a:prstGeom prst="rect">
+            <a:avLst/>
+          </a:prstGeom>
+          <a:noFill/>
+          <a:ln w="28575">
+            <a:solidFill>
+              <a:schemeClr val="tx1"/>
+            </a:solidFill>
+            <a:prstDash val="sysDash"/>
+          </a:ln>
+        </p:spPr>
+        <p:txBody>
+          <a:bodyPr wrap="square" rtlCol="0">
+            <a:spAutoFit/>
+          </a:bodyPr>
+          <a:lstStyle/>
+          <a:p>
+            <a:r>
+              <a:rPr lang="en-CA">
+                <a:solidFill>
+                  <a:schemeClr val="accent5">
+                    <a:lumMod val="75000"/>
+                  </a:schemeClr>
+                </a:solidFill>
+                <a:latin typeface="Consolas" panose="020B0609020204030204" pitchFamily="49" charset="0"/>
+              </a:rPr>
+              <a:t>Neuron</a:t>
+            </a:r>
+          </a:p>
+        </p:txBody>
+      </p:sp>
+      <p:sp>
+        <p:nvSpPr>
+          <p:cNvPr id="19" name="TextBox 18">
+            <a:extLst>
+              <a:ext uri="{FF2B5EF4-FFF2-40B4-BE49-F238E27FC236}">
+                <a16:creationId xmlns:a16="http://schemas.microsoft.com/office/drawing/2014/main" id="{133FB1FD-4784-4DAE-825B-9B1A4E1FACBC}"/>
+              </a:ext>
+            </a:extLst>
+          </p:cNvPr>
+          <p:cNvSpPr txBox="1"/>
+          <p:nvPr/>
+        </p:nvSpPr>
+        <p:spPr>
+          <a:xfrm>
+            <a:off x="5709408" y="1347071"/>
+            <a:ext cx="1194210" cy="261610"/>
+          </a:xfrm>
+          <a:prstGeom prst="rect">
+            <a:avLst/>
+          </a:prstGeom>
+          <a:noFill/>
+          <a:ln w="28575">
+            <a:solidFill>
+              <a:schemeClr val="tx1"/>
+            </a:solidFill>
+            <a:prstDash val="sysDash"/>
+          </a:ln>
+        </p:spPr>
+        <p:txBody>
+          <a:bodyPr wrap="square" rtlCol="0">
+            <a:spAutoFit/>
+          </a:bodyPr>
+          <a:lstStyle/>
+          <a:p>
+            <a:pPr algn="ctr"/>
+            <a:r>
+              <a:rPr lang="en-CA" sz="1100">
+                <a:latin typeface="Consolas" panose="020B0609020204030204" pitchFamily="49" charset="0"/>
+              </a:rPr>
+              <a:t>inputs (1-x)</a:t>
+            </a:r>
+          </a:p>
+        </p:txBody>
+      </p:sp>
+      <p:sp>
+        <p:nvSpPr>
+          <p:cNvPr id="90" name="TextBox 89">
+            <a:extLst>
+              <a:ext uri="{FF2B5EF4-FFF2-40B4-BE49-F238E27FC236}">
+                <a16:creationId xmlns:a16="http://schemas.microsoft.com/office/drawing/2014/main" id="{F17AA0E2-7016-487F-A973-A93DE82AE843}"/>
+              </a:ext>
+            </a:extLst>
+          </p:cNvPr>
+          <p:cNvSpPr txBox="1"/>
+          <p:nvPr/>
+        </p:nvSpPr>
+        <p:spPr>
+          <a:xfrm>
+            <a:off x="3578445" y="3382137"/>
+            <a:ext cx="1213609" cy="261610"/>
+          </a:xfrm>
+          <a:prstGeom prst="rect">
+            <a:avLst/>
+          </a:prstGeom>
+          <a:noFill/>
+          <a:ln w="28575">
+            <a:solidFill>
+              <a:schemeClr val="tx1"/>
+            </a:solidFill>
+            <a:prstDash val="sysDash"/>
+          </a:ln>
+        </p:spPr>
+        <p:txBody>
+          <a:bodyPr wrap="square" rtlCol="0">
+            <a:spAutoFit/>
+          </a:bodyPr>
+          <a:lstStyle/>
+          <a:p>
+            <a:pPr algn="ctr"/>
+            <a:r>
+              <a:rPr lang="en-CA" sz="1100">
+                <a:latin typeface="Consolas" panose="020B0609020204030204" pitchFamily="49" charset="0"/>
+              </a:rPr>
+              <a:t>outputs (1-x)</a:t>
+            </a:r>
+          </a:p>
+        </p:txBody>
+      </p:sp>
+      <p:sp>
+        <p:nvSpPr>
+          <p:cNvPr id="91" name="TextBox 90">
+            <a:extLst>
+              <a:ext uri="{FF2B5EF4-FFF2-40B4-BE49-F238E27FC236}">
+                <a16:creationId xmlns:a16="http://schemas.microsoft.com/office/drawing/2014/main" id="{D35D04CA-0ACA-4845-B321-DDEE22F59DFB}"/>
+              </a:ext>
+            </a:extLst>
+          </p:cNvPr>
+          <p:cNvSpPr txBox="1"/>
+          <p:nvPr/>
+        </p:nvSpPr>
+        <p:spPr>
+          <a:xfrm>
+            <a:off x="3262673" y="4852696"/>
+            <a:ext cx="2898528" cy="1477328"/>
+          </a:xfrm>
+          <a:prstGeom prst="rect">
+            <a:avLst/>
+          </a:prstGeom>
+          <a:noFill/>
+          <a:ln w="28575">
+            <a:solidFill>
+              <a:schemeClr val="tx1"/>
+            </a:solidFill>
+            <a:prstDash val="sysDash"/>
+          </a:ln>
+        </p:spPr>
+        <p:txBody>
+          <a:bodyPr wrap="square" rtlCol="0">
+            <a:spAutoFit/>
+          </a:bodyPr>
+          <a:lstStyle/>
+          <a:p>
+            <a:r>
+              <a:rPr lang="en-CA" sz="1000">
+                <a:solidFill>
+                  <a:schemeClr val="accent4"/>
+                </a:solidFill>
+                <a:latin typeface="Consolas" panose="020B0609020204030204" pitchFamily="49" charset="0"/>
+              </a:rPr>
+              <a:t>Model Attributes</a:t>
+            </a:r>
+          </a:p>
+          <a:p>
+            <a:r>
+              <a:rPr lang="en-CA" sz="1000">
+                <a:latin typeface="Consolas" panose="020B0609020204030204" pitchFamily="49" charset="0"/>
+              </a:rPr>
+              <a:t>hookupRandomOrFromInput: </a:t>
+            </a:r>
+            <a:r>
+              <a:rPr lang="en-CA" sz="1000">
+                <a:solidFill>
+                  <a:srgbClr val="FF0000"/>
+                </a:solidFill>
+                <a:latin typeface="Consolas" panose="020B0609020204030204" pitchFamily="49" charset="0"/>
+              </a:rPr>
+              <a:t>boolean</a:t>
+            </a:r>
+            <a:endParaRPr lang="en-CA" sz="1000">
+              <a:latin typeface="Consolas" panose="020B0609020204030204" pitchFamily="49" charset="0"/>
+            </a:endParaRPr>
+          </a:p>
+          <a:p>
+            <a:r>
+              <a:rPr lang="en-CA" sz="1000">
+                <a:latin typeface="Consolas" panose="020B0609020204030204" pitchFamily="49" charset="0"/>
+              </a:rPr>
+              <a:t>hookupNeuronDistance: </a:t>
+            </a:r>
+            <a:r>
+              <a:rPr lang="en-CA" sz="1000">
+                <a:solidFill>
+                  <a:srgbClr val="FF0000"/>
+                </a:solidFill>
+                <a:latin typeface="Consolas" panose="020B0609020204030204" pitchFamily="49" charset="0"/>
+              </a:rPr>
+              <a:t>number</a:t>
+            </a:r>
+          </a:p>
+          <a:p>
+            <a:r>
+              <a:rPr lang="en-CA" sz="1000">
+                <a:latin typeface="Consolas" panose="020B0609020204030204" pitchFamily="49" charset="0"/>
+              </a:rPr>
+              <a:t>hookupConnections: </a:t>
+            </a:r>
+            <a:r>
+              <a:rPr lang="en-CA" sz="1000">
+                <a:solidFill>
+                  <a:srgbClr val="FF0000"/>
+                </a:solidFill>
+                <a:latin typeface="Consolas" panose="020B0609020204030204" pitchFamily="49" charset="0"/>
+              </a:rPr>
+              <a:t>number: integer</a:t>
+            </a:r>
+          </a:p>
+          <a:p>
+            <a:endParaRPr lang="en-CA" sz="1000">
+              <a:latin typeface="Consolas" panose="020B0609020204030204" pitchFamily="49" charset="0"/>
+            </a:endParaRPr>
+          </a:p>
+          <a:p>
+            <a:r>
+              <a:rPr lang="en-CA" sz="1000">
+                <a:latin typeface="Consolas" panose="020B0609020204030204" pitchFamily="49" charset="0"/>
+              </a:rPr>
+              <a:t>neuronTypes: </a:t>
+            </a:r>
+            <a:r>
+              <a:rPr lang="en-CA" sz="1000">
+                <a:solidFill>
+                  <a:srgbClr val="FF0000"/>
+                </a:solidFill>
+                <a:latin typeface="Consolas" panose="020B0609020204030204" pitchFamily="49" charset="0"/>
+              </a:rPr>
+              <a:t>number: integer</a:t>
+            </a:r>
+          </a:p>
+          <a:p>
+            <a:r>
+              <a:rPr lang="en-CA" sz="1000">
+                <a:latin typeface="Consolas" panose="020B0609020204030204" pitchFamily="49" charset="0"/>
+              </a:rPr>
+              <a:t>neuronType: </a:t>
+            </a:r>
+            <a:r>
+              <a:rPr lang="en-CA" sz="1000">
+                <a:solidFill>
+                  <a:srgbClr val="FF0000"/>
+                </a:solidFill>
+                <a:latin typeface="Consolas" panose="020B0609020204030204" pitchFamily="49" charset="0"/>
+              </a:rPr>
+              <a:t>array</a:t>
+            </a:r>
+          </a:p>
+          <a:p>
+            <a:endParaRPr lang="en-CA" sz="1000">
+              <a:solidFill>
+                <a:srgbClr val="FF0000"/>
+              </a:solidFill>
+              <a:latin typeface="Consolas" panose="020B0609020204030204" pitchFamily="49" charset="0"/>
+            </a:endParaRPr>
+          </a:p>
+          <a:p>
+            <a:r>
+              <a:rPr lang="en-CA" sz="1000">
+                <a:latin typeface="Consolas" panose="020B0609020204030204" pitchFamily="49" charset="0"/>
+              </a:rPr>
+              <a:t>totalNeuronPortionSize : </a:t>
+            </a:r>
+            <a:r>
+              <a:rPr lang="en-CA" sz="1000">
+                <a:solidFill>
+                  <a:srgbClr val="FF0000"/>
+                </a:solidFill>
+                <a:latin typeface="Consolas" panose="020B0609020204030204" pitchFamily="49" charset="0"/>
+              </a:rPr>
+              <a:t>number</a:t>
+            </a:r>
+            <a:endParaRPr lang="en-CA" sz="1000">
+              <a:latin typeface="Consolas" panose="020B0609020204030204" pitchFamily="49" charset="0"/>
+            </a:endParaRPr>
+          </a:p>
+        </p:txBody>
+      </p:sp>
+      <p:sp>
+        <p:nvSpPr>
+          <p:cNvPr id="98" name="Oval 97">
+            <a:extLst>
+              <a:ext uri="{FF2B5EF4-FFF2-40B4-BE49-F238E27FC236}">
+                <a16:creationId xmlns:a16="http://schemas.microsoft.com/office/drawing/2014/main" id="{F6D1CD3C-A711-4704-B55A-4B817D011186}"/>
+              </a:ext>
+            </a:extLst>
+          </p:cNvPr>
+          <p:cNvSpPr/>
+          <p:nvPr/>
+        </p:nvSpPr>
+        <p:spPr>
+          <a:xfrm>
+            <a:off x="920653" y="1858319"/>
+            <a:ext cx="1219029" cy="1221003"/>
+          </a:xfrm>
+          <a:prstGeom prst="ellipse">
+            <a:avLst/>
+          </a:prstGeom>
+          <a:noFill/>
+          <a:ln>
+            <a:solidFill>
+              <a:schemeClr val="accent5">
+                <a:lumMod val="75000"/>
+              </a:schemeClr>
+            </a:solidFill>
+            <a:prstDash val="dash"/>
+          </a:ln>
+        </p:spPr>
+        <p:style>
+          <a:lnRef idx="2">
+            <a:schemeClr val="accent1">
+              <a:shade val="50000"/>
+            </a:schemeClr>
+          </a:lnRef>
+          <a:fillRef idx="1">
+            <a:schemeClr val="accent1"/>
+          </a:fillRef>
+          <a:effectRef idx="0">
+            <a:schemeClr val="accent1"/>
+          </a:effectRef>
+          <a:fontRef idx="minor">
+            <a:schemeClr val="lt1"/>
+          </a:fontRef>
+        </p:style>
+        <p:txBody>
+          <a:bodyPr rtlCol="0" anchor="ctr"/>
+          <a:lstStyle/>
+          <a:p>
+            <a:pPr algn="ctr"/>
+            <a:endParaRPr lang="en-CA">
+              <a:latin typeface="Consolas" panose="020B0609020204030204" pitchFamily="49" charset="0"/>
+            </a:endParaRPr>
+          </a:p>
+        </p:txBody>
+      </p:sp>
+      <p:sp>
+        <p:nvSpPr>
+          <p:cNvPr id="99" name="Oval 98">
+            <a:extLst>
+              <a:ext uri="{FF2B5EF4-FFF2-40B4-BE49-F238E27FC236}">
+                <a16:creationId xmlns:a16="http://schemas.microsoft.com/office/drawing/2014/main" id="{B077E68B-F4B9-4D71-AC05-FAA6B1C463B7}"/>
+              </a:ext>
+            </a:extLst>
+          </p:cNvPr>
+          <p:cNvSpPr/>
+          <p:nvPr/>
+        </p:nvSpPr>
+        <p:spPr>
+          <a:xfrm>
+            <a:off x="1399094" y="2339299"/>
+            <a:ext cx="266472" cy="266903"/>
+          </a:xfrm>
+          <a:prstGeom prst="ellipse">
+            <a:avLst/>
+          </a:prstGeom>
+          <a:solidFill>
+            <a:schemeClr val="accent5">
+              <a:lumMod val="75000"/>
+            </a:schemeClr>
+          </a:solidFill>
+          <a:ln w="38100">
+            <a:solidFill>
+              <a:schemeClr val="accent5">
+                <a:lumMod val="50000"/>
+              </a:schemeClr>
+            </a:solidFill>
+            <a:prstDash val="dash"/>
+          </a:ln>
+        </p:spPr>
+        <p:style>
+          <a:lnRef idx="2">
+            <a:schemeClr val="accent1">
+              <a:shade val="50000"/>
+            </a:schemeClr>
+          </a:lnRef>
+          <a:fillRef idx="1">
+            <a:schemeClr val="accent1"/>
+          </a:fillRef>
+          <a:effectRef idx="0">
+            <a:schemeClr val="accent1"/>
+          </a:effectRef>
+          <a:fontRef idx="minor">
+            <a:schemeClr val="lt1"/>
+          </a:fontRef>
+        </p:style>
+        <p:txBody>
+          <a:bodyPr rtlCol="0" anchor="ctr"/>
+          <a:lstStyle/>
+          <a:p>
+            <a:pPr algn="ctr"/>
+            <a:endParaRPr lang="en-CA">
+              <a:latin typeface="Consolas" panose="020B0609020204030204" pitchFamily="49" charset="0"/>
+            </a:endParaRPr>
+          </a:p>
+        </p:txBody>
+      </p:sp>
+      <p:cxnSp>
+        <p:nvCxnSpPr>
+          <p:cNvPr id="100" name="Straight Arrow Connector 99">
+            <a:extLst>
+              <a:ext uri="{FF2B5EF4-FFF2-40B4-BE49-F238E27FC236}">
+                <a16:creationId xmlns:a16="http://schemas.microsoft.com/office/drawing/2014/main" id="{076A79B0-07A9-41E6-A2E8-CDACBA6D4E2D}"/>
+              </a:ext>
+            </a:extLst>
+          </p:cNvPr>
+          <p:cNvCxnSpPr>
+            <a:cxnSpLocks/>
+          </p:cNvCxnSpPr>
+          <p:nvPr/>
+        </p:nvCxnSpPr>
+        <p:spPr>
+          <a:xfrm>
+            <a:off x="1551707" y="2468820"/>
+            <a:ext cx="525886" cy="235355"/>
+          </a:xfrm>
+          <a:prstGeom prst="straightConnector1">
+            <a:avLst/>
+          </a:prstGeom>
+          <a:ln>
+            <a:solidFill>
+              <a:schemeClr val="accent6">
+                <a:lumMod val="75000"/>
+              </a:schemeClr>
+            </a:solidFill>
+            <a:tailEnd type="triangle"/>
+          </a:ln>
+        </p:spPr>
+        <p:style>
+          <a:lnRef idx="1">
+            <a:schemeClr val="accent1"/>
+          </a:lnRef>
+          <a:fillRef idx="0">
+            <a:schemeClr val="accent1"/>
+          </a:fillRef>
+          <a:effectRef idx="0">
+            <a:schemeClr val="accent1"/>
+          </a:effectRef>
+          <a:fontRef idx="minor">
+            <a:schemeClr val="tx1"/>
+          </a:fontRef>
+        </p:style>
+      </p:cxnSp>
+      <p:cxnSp>
+        <p:nvCxnSpPr>
+          <p:cNvPr id="105" name="Connector: Elbow 104">
+            <a:extLst>
+              <a:ext uri="{FF2B5EF4-FFF2-40B4-BE49-F238E27FC236}">
+                <a16:creationId xmlns:a16="http://schemas.microsoft.com/office/drawing/2014/main" id="{D6929B8E-E9C8-438D-88DB-C0C32275F946}"/>
+              </a:ext>
+            </a:extLst>
+          </p:cNvPr>
+          <p:cNvCxnSpPr>
+            <a:cxnSpLocks/>
+            <a:endCxn id="91" idx="1"/>
+          </p:cNvCxnSpPr>
+          <p:nvPr/>
+        </p:nvCxnSpPr>
+        <p:spPr>
+          <a:xfrm>
+            <a:off x="2212906" y="4735451"/>
+            <a:ext cx="1049767" cy="957879"/>
+          </a:xfrm>
+          <a:prstGeom prst="bentConnector3">
+            <a:avLst>
+              <a:gd name="adj1" fmla="val 50000"/>
+            </a:avLst>
+          </a:prstGeom>
+          <a:ln>
+            <a:solidFill>
+              <a:schemeClr val="tx1"/>
+            </a:solidFill>
+            <a:tailEnd type="triangle"/>
+          </a:ln>
+        </p:spPr>
+        <p:style>
+          <a:lnRef idx="1">
+            <a:schemeClr val="accent1"/>
+          </a:lnRef>
+          <a:fillRef idx="0">
+            <a:schemeClr val="accent1"/>
+          </a:fillRef>
+          <a:effectRef idx="0">
+            <a:schemeClr val="accent1"/>
+          </a:effectRef>
+          <a:fontRef idx="minor">
+            <a:schemeClr val="tx1"/>
+          </a:fontRef>
+        </p:style>
+      </p:cxnSp>
+      <p:cxnSp>
+        <p:nvCxnSpPr>
+          <p:cNvPr id="106" name="Straight Connector 105">
+            <a:extLst>
+              <a:ext uri="{FF2B5EF4-FFF2-40B4-BE49-F238E27FC236}">
+                <a16:creationId xmlns:a16="http://schemas.microsoft.com/office/drawing/2014/main" id="{5E5F04D3-680D-4C42-8251-DBA2962CCB9A}"/>
+              </a:ext>
+            </a:extLst>
+          </p:cNvPr>
+          <p:cNvCxnSpPr>
+            <a:cxnSpLocks/>
+          </p:cNvCxnSpPr>
+          <p:nvPr/>
+        </p:nvCxnSpPr>
+        <p:spPr>
+          <a:xfrm flipH="1">
+            <a:off x="1234258" y="4321684"/>
+            <a:ext cx="1437921" cy="1266704"/>
+          </a:xfrm>
+          <a:prstGeom prst="line">
+            <a:avLst/>
+          </a:prstGeom>
+          <a:ln>
+            <a:solidFill>
+              <a:schemeClr val="tx1"/>
+            </a:solidFill>
+          </a:ln>
+        </p:spPr>
+        <p:style>
+          <a:lnRef idx="1">
+            <a:schemeClr val="accent1"/>
+          </a:lnRef>
+          <a:fillRef idx="0">
+            <a:schemeClr val="accent1"/>
+          </a:fillRef>
+          <a:effectRef idx="0">
+            <a:schemeClr val="accent1"/>
+          </a:effectRef>
+          <a:fontRef idx="minor">
+            <a:schemeClr val="tx1"/>
+          </a:fontRef>
+        </p:style>
+      </p:cxnSp>
+      <p:sp>
+        <p:nvSpPr>
+          <p:cNvPr id="128" name="TextBox 127">
+            <a:extLst>
+              <a:ext uri="{FF2B5EF4-FFF2-40B4-BE49-F238E27FC236}">
+                <a16:creationId xmlns:a16="http://schemas.microsoft.com/office/drawing/2014/main" id="{3E7FA33E-7ABF-41CF-9764-7C4CF58DDC38}"/>
+              </a:ext>
+            </a:extLst>
+          </p:cNvPr>
+          <p:cNvSpPr txBox="1"/>
+          <p:nvPr/>
+        </p:nvSpPr>
+        <p:spPr>
+          <a:xfrm>
+            <a:off x="5975940" y="1819651"/>
+            <a:ext cx="927678" cy="261610"/>
+          </a:xfrm>
+          <a:prstGeom prst="rect">
+            <a:avLst/>
+          </a:prstGeom>
+          <a:noFill/>
+          <a:ln w="28575">
+            <a:solidFill>
+              <a:schemeClr val="tx1"/>
+            </a:solidFill>
+            <a:prstDash val="sysDash"/>
+          </a:ln>
+        </p:spPr>
+        <p:txBody>
+          <a:bodyPr wrap="square" rtlCol="0">
+            <a:spAutoFit/>
+          </a:bodyPr>
+          <a:lstStyle/>
+          <a:p>
+            <a:pPr algn="ctr"/>
+            <a:r>
+              <a:rPr lang="en-CA" sz="1100">
+                <a:latin typeface="Consolas" panose="020B0609020204030204" pitchFamily="49" charset="0"/>
+              </a:rPr>
+              <a:t>soma (1)</a:t>
+            </a:r>
+          </a:p>
+        </p:txBody>
+      </p:sp>
+    </p:spTree>
+    <p:extLst>
+      <p:ext uri="{BB962C8B-B14F-4D97-AF65-F5344CB8AC3E}">
+        <p14:creationId xmlns:p14="http://schemas.microsoft.com/office/powerpoint/2010/main" val="127185371"/>
       </p:ext>
     </p:extLst>
   </p:cSld>

</xml_diff>